<commit_message>
updates slides on metaclasses
</commit_message>
<xml_diff>
--- a/semaine7/CO12AL-W7-VIDEO04-SLIDE01.pptx
+++ b/semaine7/CO12AL-W7-VIDEO04-SLIDE01.pptx
@@ -5,10 +5,10 @@
     <p:sldMasterId id="2147483649" r:id="rId1"/>
   </p:sldMasterIdLst>
   <p:notesMasterIdLst>
-    <p:notesMasterId r:id="rId22"/>
+    <p:notesMasterId r:id="rId24"/>
   </p:notesMasterIdLst>
   <p:handoutMasterIdLst>
-    <p:handoutMasterId r:id="rId23"/>
+    <p:handoutMasterId r:id="rId25"/>
   </p:handoutMasterIdLst>
   <p:sldIdLst>
     <p:sldId id="256" r:id="rId2"/>
@@ -30,7 +30,9 @@
     <p:sldId id="280" r:id="rId18"/>
     <p:sldId id="282" r:id="rId19"/>
     <p:sldId id="283" r:id="rId20"/>
-    <p:sldId id="281" r:id="rId21"/>
+    <p:sldId id="285" r:id="rId21"/>
+    <p:sldId id="286" r:id="rId22"/>
+    <p:sldId id="287" r:id="rId23"/>
   </p:sldIdLst>
   <p:sldSz cx="12192000" cy="6858000"/>
   <p:notesSz cx="7099300" cy="10234613"/>
@@ -183,7 +185,9 @@
             <p14:sldId id="280"/>
             <p14:sldId id="282"/>
             <p14:sldId id="283"/>
-            <p14:sldId id="281"/>
+            <p14:sldId id="285"/>
+            <p14:sldId id="286"/>
+            <p14:sldId id="287"/>
           </p14:sldIdLst>
         </p14:section>
       </p14:sectionLst>
@@ -989,7 +993,20 @@
             </a:r>
             <a:r>
               <a:rPr lang="fr-FR" baseline="0" dirty="0" smtClean="0"/>
-              <a:t> y a trois grandes catégories d’objets</a:t>
+              <a:t> y a trois grandes </a:t>
+            </a:r>
+            <a:r>
+              <a:rPr lang="fr-FR" baseline="0" dirty="0" smtClean="0"/>
+              <a:t>catégories d’objets</a:t>
+            </a:r>
+          </a:p>
+          <a:p>
+            <a:endParaRPr lang="fr-FR" baseline="0" dirty="0" smtClean="0"/>
+          </a:p>
+          <a:p>
+            <a:r>
+              <a:rPr lang="fr-FR" dirty="0" smtClean="0"/>
+              <a:t>http://www.cafepy.com/article/python_types_and_objects/python_types_and_objects.html</a:t>
             </a:r>
             <a:endParaRPr lang="fr-FR" dirty="0"/>
           </a:p>
@@ -2465,22 +2482,48 @@
           <a:lstStyle/>
           <a:p>
             <a:r>
-              <a:rPr lang="fr-FR" dirty="0" smtClean="0"/>
-              <a:t>Allons encore une</a:t>
-            </a:r>
-            <a:r>
               <a:rPr lang="fr-FR" baseline="0" dirty="0" smtClean="0"/>
-              <a:t> étape plus loin, comment la </a:t>
+              <a:t>__new__ est une méthode statique. On lui passe comme premier argument la </a:t>
             </a:r>
             <a:r>
               <a:rPr lang="fr-FR" baseline="0" dirty="0" err="1" smtClean="0"/>
-              <a:t>metaclasse</a:t>
+              <a:t>métaclasse</a:t>
             </a:r>
             <a:r>
               <a:rPr lang="fr-FR" baseline="0" dirty="0" smtClean="0"/>
-              <a:t> crée l’instance de la classe. </a:t>
-            </a:r>
-            <a:endParaRPr lang="fr-FR" dirty="0"/>
+              <a:t>. </a:t>
+            </a:r>
+          </a:p>
+          <a:p>
+            <a:r>
+              <a:rPr lang="fr-FR" baseline="0" dirty="0" smtClean="0"/>
+              <a:t>__</a:t>
+            </a:r>
+            <a:r>
+              <a:rPr lang="fr-FR" baseline="0" dirty="0" err="1" smtClean="0"/>
+              <a:t>init</a:t>
+            </a:r>
+            <a:r>
+              <a:rPr lang="fr-FR" baseline="0" dirty="0" smtClean="0"/>
+              <a:t>__ est appelé sur la classe </a:t>
+            </a:r>
+            <a:r>
+              <a:rPr lang="fr-FR" baseline="0" dirty="0" err="1" smtClean="0"/>
+              <a:t>cls</a:t>
+            </a:r>
+            <a:r>
+              <a:rPr lang="fr-FR" baseline="0" dirty="0" smtClean="0"/>
+              <a:t> et non sur l’instance de la classe </a:t>
+            </a:r>
+            <a:r>
+              <a:rPr lang="fr-FR" baseline="0" dirty="0" err="1" smtClean="0"/>
+              <a:t>cls</a:t>
+            </a:r>
+            <a:r>
+              <a:rPr lang="fr-FR" baseline="0" dirty="0" smtClean="0"/>
+              <a:t>. </a:t>
+            </a:r>
+            <a:endParaRPr lang="fr-FR" baseline="0" dirty="0" smtClean="0"/>
           </a:p>
         </p:txBody>
       </p:sp>
@@ -2516,7 +2559,281 @@
     </p:spTree>
     <p:extLst>
       <p:ext uri="{BB962C8B-B14F-4D97-AF65-F5344CB8AC3E}">
-        <p14:creationId xmlns:p14="http://schemas.microsoft.com/office/powerpoint/2010/main" val="2192074682"/>
+        <p14:creationId xmlns:p14="http://schemas.microsoft.com/office/powerpoint/2010/main" val="3224721912"/>
+      </p:ext>
+    </p:extLst>
+  </p:cSld>
+  <p:clrMapOvr>
+    <a:masterClrMapping/>
+  </p:clrMapOvr>
+</p:notes>
+</file>
+
+<file path=ppt/notesSlides/notesSlide18.xml><?xml version="1.0" encoding="utf-8"?>
+<p:notes xmlns:a="http://schemas.openxmlformats.org/drawingml/2006/main" xmlns:r="http://schemas.openxmlformats.org/officeDocument/2006/relationships" xmlns:p="http://schemas.openxmlformats.org/presentationml/2006/main">
+  <p:cSld>
+    <p:spTree>
+      <p:nvGrpSpPr>
+        <p:cNvPr id="1" name=""/>
+        <p:cNvGrpSpPr/>
+        <p:nvPr/>
+      </p:nvGrpSpPr>
+      <p:grpSpPr>
+        <a:xfrm>
+          <a:off x="0" y="0"/>
+          <a:ext cx="0" cy="0"/>
+          <a:chOff x="0" y="0"/>
+          <a:chExt cx="0" cy="0"/>
+        </a:xfrm>
+      </p:grpSpPr>
+      <p:sp>
+        <p:nvSpPr>
+          <p:cNvPr id="2" name="Espace réservé de l'image des diapositives 1"/>
+          <p:cNvSpPr>
+            <a:spLocks noGrp="1" noRot="1" noChangeAspect="1"/>
+          </p:cNvSpPr>
+          <p:nvPr>
+            <p:ph type="sldImg"/>
+          </p:nvPr>
+        </p:nvSpPr>
+        <p:spPr/>
+      </p:sp>
+      <p:sp>
+        <p:nvSpPr>
+          <p:cNvPr id="3" name="Espace réservé des commentaires 2"/>
+          <p:cNvSpPr>
+            <a:spLocks noGrp="1"/>
+          </p:cNvSpPr>
+          <p:nvPr>
+            <p:ph type="body" idx="1"/>
+          </p:nvPr>
+        </p:nvSpPr>
+        <p:spPr/>
+        <p:txBody>
+          <a:bodyPr/>
+          <a:lstStyle/>
+          <a:p>
+            <a:r>
+              <a:rPr lang="fr-FR" baseline="0" dirty="0" smtClean="0"/>
+              <a:t>__new__ est une méthode statique. On lui passe comme premier argument la </a:t>
+            </a:r>
+            <a:r>
+              <a:rPr lang="fr-FR" baseline="0" dirty="0" err="1" smtClean="0"/>
+              <a:t>métaclasse</a:t>
+            </a:r>
+            <a:r>
+              <a:rPr lang="fr-FR" baseline="0" dirty="0" smtClean="0"/>
+              <a:t>. </a:t>
+            </a:r>
+          </a:p>
+          <a:p>
+            <a:r>
+              <a:rPr lang="fr-FR" baseline="0" dirty="0" smtClean="0"/>
+              <a:t>__</a:t>
+            </a:r>
+            <a:r>
+              <a:rPr lang="fr-FR" baseline="0" dirty="0" err="1" smtClean="0"/>
+              <a:t>init</a:t>
+            </a:r>
+            <a:r>
+              <a:rPr lang="fr-FR" baseline="0" dirty="0" smtClean="0"/>
+              <a:t>__ est appelé sur la classe </a:t>
+            </a:r>
+            <a:r>
+              <a:rPr lang="fr-FR" baseline="0" dirty="0" err="1" smtClean="0"/>
+              <a:t>cls</a:t>
+            </a:r>
+            <a:r>
+              <a:rPr lang="fr-FR" baseline="0" dirty="0" smtClean="0"/>
+              <a:t> et non sur l’instance de la classe </a:t>
+            </a:r>
+            <a:r>
+              <a:rPr lang="fr-FR" baseline="0" dirty="0" err="1" smtClean="0"/>
+              <a:t>cls</a:t>
+            </a:r>
+            <a:r>
+              <a:rPr lang="fr-FR" baseline="0" dirty="0" smtClean="0"/>
+              <a:t>. </a:t>
+            </a:r>
+            <a:endParaRPr lang="fr-FR" baseline="0" dirty="0" smtClean="0"/>
+          </a:p>
+        </p:txBody>
+      </p:sp>
+      <p:sp>
+        <p:nvSpPr>
+          <p:cNvPr id="4" name="Espace réservé du numéro de diapositive 3"/>
+          <p:cNvSpPr>
+            <a:spLocks noGrp="1"/>
+          </p:cNvSpPr>
+          <p:nvPr>
+            <p:ph type="sldNum" sz="quarter" idx="10"/>
+          </p:nvPr>
+        </p:nvSpPr>
+        <p:spPr/>
+        <p:txBody>
+          <a:bodyPr/>
+          <a:lstStyle/>
+          <a:p>
+            <a:pPr>
+              <a:defRPr/>
+            </a:pPr>
+            <a:fld id="{9E8EB9F5-F2F7-4A48-A943-9B409357C15C}" type="slidenum">
+              <a:rPr lang="en-US" smtClean="0"/>
+              <a:pPr>
+                <a:defRPr/>
+              </a:pPr>
+              <a:t>21</a:t>
+            </a:fld>
+            <a:endParaRPr lang="en-US"/>
+          </a:p>
+        </p:txBody>
+      </p:sp>
+    </p:spTree>
+    <p:extLst>
+      <p:ext uri="{BB962C8B-B14F-4D97-AF65-F5344CB8AC3E}">
+        <p14:creationId xmlns:p14="http://schemas.microsoft.com/office/powerpoint/2010/main" val="606563412"/>
+      </p:ext>
+    </p:extLst>
+  </p:cSld>
+  <p:clrMapOvr>
+    <a:masterClrMapping/>
+  </p:clrMapOvr>
+</p:notes>
+</file>
+
+<file path=ppt/notesSlides/notesSlide19.xml><?xml version="1.0" encoding="utf-8"?>
+<p:notes xmlns:a="http://schemas.openxmlformats.org/drawingml/2006/main" xmlns:r="http://schemas.openxmlformats.org/officeDocument/2006/relationships" xmlns:p="http://schemas.openxmlformats.org/presentationml/2006/main">
+  <p:cSld>
+    <p:spTree>
+      <p:nvGrpSpPr>
+        <p:cNvPr id="1" name=""/>
+        <p:cNvGrpSpPr/>
+        <p:nvPr/>
+      </p:nvGrpSpPr>
+      <p:grpSpPr>
+        <a:xfrm>
+          <a:off x="0" y="0"/>
+          <a:ext cx="0" cy="0"/>
+          <a:chOff x="0" y="0"/>
+          <a:chExt cx="0" cy="0"/>
+        </a:xfrm>
+      </p:grpSpPr>
+      <p:sp>
+        <p:nvSpPr>
+          <p:cNvPr id="2" name="Espace réservé de l'image des diapositives 1"/>
+          <p:cNvSpPr>
+            <a:spLocks noGrp="1" noRot="1" noChangeAspect="1"/>
+          </p:cNvSpPr>
+          <p:nvPr>
+            <p:ph type="sldImg"/>
+          </p:nvPr>
+        </p:nvSpPr>
+        <p:spPr/>
+      </p:sp>
+      <p:sp>
+        <p:nvSpPr>
+          <p:cNvPr id="3" name="Espace réservé des commentaires 2"/>
+          <p:cNvSpPr>
+            <a:spLocks noGrp="1"/>
+          </p:cNvSpPr>
+          <p:nvPr>
+            <p:ph type="body" idx="1"/>
+          </p:nvPr>
+        </p:nvSpPr>
+        <p:spPr/>
+        <p:txBody>
+          <a:bodyPr/>
+          <a:lstStyle/>
+          <a:p>
+            <a:r>
+              <a:rPr lang="fr-FR" baseline="0" dirty="0" smtClean="0"/>
+              <a:t>Dans __new__ c’est obligatoire de faire à la fin un return </a:t>
+            </a:r>
+            <a:r>
+              <a:rPr lang="en-US" dirty="0" err="1" smtClean="0">
+                <a:solidFill>
+                  <a:srgbClr val="FF0000"/>
+                </a:solidFill>
+                <a:latin typeface="Courier New" panose="02070309020205020404" pitchFamily="49" charset="0"/>
+                <a:cs typeface="Courier New" panose="02070309020205020404" pitchFamily="49" charset="0"/>
+              </a:rPr>
+              <a:t>type.__new</a:t>
+            </a:r>
+            <a:r>
+              <a:rPr lang="en-US" dirty="0" smtClean="0">
+                <a:solidFill>
+                  <a:srgbClr val="FF0000"/>
+                </a:solidFill>
+                <a:latin typeface="Courier New" panose="02070309020205020404" pitchFamily="49" charset="0"/>
+                <a:cs typeface="Courier New" panose="02070309020205020404" pitchFamily="49" charset="0"/>
+              </a:rPr>
+              <a:t>__(meta, name, bases, </a:t>
+            </a:r>
+            <a:r>
+              <a:rPr lang="en-US" dirty="0" err="1" smtClean="0">
+                <a:solidFill>
+                  <a:srgbClr val="FF0000"/>
+                </a:solidFill>
+                <a:latin typeface="Courier New" panose="02070309020205020404" pitchFamily="49" charset="0"/>
+                <a:cs typeface="Courier New" panose="02070309020205020404" pitchFamily="49" charset="0"/>
+              </a:rPr>
+              <a:t>classdict</a:t>
+            </a:r>
+            <a:r>
+              <a:rPr lang="en-US" dirty="0" smtClean="0">
+                <a:solidFill>
+                  <a:srgbClr val="FF0000"/>
+                </a:solidFill>
+                <a:latin typeface="Courier New" panose="02070309020205020404" pitchFamily="49" charset="0"/>
+                <a:cs typeface="Courier New" panose="02070309020205020404" pitchFamily="49" charset="0"/>
+              </a:rPr>
+              <a:t>)</a:t>
+            </a:r>
+          </a:p>
+          <a:p>
+            <a:endParaRPr lang="en-US" dirty="0" smtClean="0">
+              <a:latin typeface="Courier New" panose="02070309020205020404" pitchFamily="49" charset="0"/>
+              <a:cs typeface="Courier New" panose="02070309020205020404" pitchFamily="49" charset="0"/>
+            </a:endParaRPr>
+          </a:p>
+          <a:p>
+            <a:endParaRPr lang="fr-FR" baseline="0" dirty="0" smtClean="0"/>
+          </a:p>
+        </p:txBody>
+      </p:sp>
+      <p:sp>
+        <p:nvSpPr>
+          <p:cNvPr id="4" name="Espace réservé du numéro de diapositive 3"/>
+          <p:cNvSpPr>
+            <a:spLocks noGrp="1"/>
+          </p:cNvSpPr>
+          <p:nvPr>
+            <p:ph type="sldNum" sz="quarter" idx="10"/>
+          </p:nvPr>
+        </p:nvSpPr>
+        <p:spPr/>
+        <p:txBody>
+          <a:bodyPr/>
+          <a:lstStyle/>
+          <a:p>
+            <a:pPr>
+              <a:defRPr/>
+            </a:pPr>
+            <a:fld id="{9E8EB9F5-F2F7-4A48-A943-9B409357C15C}" type="slidenum">
+              <a:rPr lang="en-US" smtClean="0"/>
+              <a:pPr>
+                <a:defRPr/>
+              </a:pPr>
+              <a:t>22</a:t>
+            </a:fld>
+            <a:endParaRPr lang="en-US"/>
+          </a:p>
+        </p:txBody>
+      </p:sp>
+    </p:spTree>
+    <p:extLst>
+      <p:ext uri="{BB962C8B-B14F-4D97-AF65-F5344CB8AC3E}">
+        <p14:creationId xmlns:p14="http://schemas.microsoft.com/office/powerpoint/2010/main" val="1641327291"/>
       </p:ext>
     </p:extLst>
   </p:cSld>
@@ -6723,19 +7040,7 @@
               <a:rPr lang="fr-FR" sz="6000" dirty="0" smtClean="0">
                 <a:latin typeface="Calibri" panose="020F0502020204030204" pitchFamily="34" charset="0"/>
               </a:rPr>
-              <a:t>Tout est </a:t>
-            </a:r>
-            <a:r>
-              <a:rPr lang="fr-FR" sz="6000" dirty="0" smtClean="0">
-                <a:latin typeface="Calibri" panose="020F0502020204030204" pitchFamily="34" charset="0"/>
-              </a:rPr>
-              <a:t>un </a:t>
-            </a:r>
-            <a:r>
-              <a:rPr lang="fr-FR" sz="6000" dirty="0" smtClean="0">
-                <a:latin typeface="Calibri" panose="020F0502020204030204" pitchFamily="34" charset="0"/>
-              </a:rPr>
-              <a:t>objet en Python</a:t>
+              <a:t>Tout est un objet en Python</a:t>
             </a:r>
             <a:endParaRPr lang="fr-FR" sz="6000" dirty="0">
               <a:latin typeface="Calibri" panose="020F0502020204030204" pitchFamily="34" charset="0"/>
@@ -7157,13 +7462,7 @@
               <a:rPr lang="fr-FR" sz="6000" dirty="0" smtClean="0">
                 <a:latin typeface="Calibri" panose="020F0502020204030204" pitchFamily="34" charset="0"/>
               </a:rPr>
-              <a:t>instancie les </a:t>
-            </a:r>
-            <a:r>
-              <a:rPr lang="fr-FR" sz="6000" dirty="0" smtClean="0">
-                <a:latin typeface="Calibri" panose="020F0502020204030204" pitchFamily="34" charset="0"/>
-              </a:rPr>
-              <a:t>classes</a:t>
+              <a:t>instancie les classes</a:t>
             </a:r>
           </a:p>
           <a:p>
@@ -7189,14 +7488,7 @@
                 <a:latin typeface="Calibri" panose="020F0502020204030204" pitchFamily="34" charset="0"/>
                 <a:cs typeface="Courier New" panose="02070309020205020404" pitchFamily="49" charset="0"/>
               </a:rPr>
-              <a:t>Toutes </a:t>
-            </a:r>
-            <a:r>
-              <a:rPr lang="fr-FR" sz="6000" dirty="0" smtClean="0">
-                <a:latin typeface="Calibri" panose="020F0502020204030204" pitchFamily="34" charset="0"/>
-                <a:cs typeface="Courier New" panose="02070309020205020404" pitchFamily="49" charset="0"/>
-              </a:rPr>
-              <a:t>les classes </a:t>
+              <a:t>Toutes les classes </a:t>
             </a:r>
             <a:br>
               <a:rPr lang="fr-FR" sz="6000" dirty="0" smtClean="0">
@@ -7435,14 +7727,7 @@
                 <a:latin typeface="Calibri" panose="020F0502020204030204" pitchFamily="34" charset="0"/>
                 <a:cs typeface="Courier New" panose="02070309020205020404" pitchFamily="49" charset="0"/>
               </a:rPr>
-              <a:t>On </a:t>
-            </a:r>
-            <a:r>
-              <a:rPr lang="fr-FR" sz="6000" dirty="0" smtClean="0">
-                <a:latin typeface="Calibri" panose="020F0502020204030204" pitchFamily="34" charset="0"/>
-                <a:cs typeface="Courier New" panose="02070309020205020404" pitchFamily="49" charset="0"/>
-              </a:rPr>
-              <a:t>appelle </a:t>
+              <a:t>On appelle </a:t>
             </a:r>
             <a:r>
               <a:rPr lang="fr-FR" sz="6000" i="1" dirty="0" smtClean="0">
@@ -8990,10 +9275,6 @@
               </a:rPr>
               <a:t>Contrôle de la pré-instanciation et de l’initialisation de l’objet classe</a:t>
             </a:r>
-            <a:endParaRPr lang="fr-FR" sz="5400" dirty="0" smtClean="0">
-              <a:latin typeface="Calibri" panose="020F0502020204030204" pitchFamily="34" charset="0"/>
-              <a:cs typeface="Courier New" panose="02070309020205020404" pitchFamily="49" charset="0"/>
-            </a:endParaRPr>
           </a:p>
         </p:txBody>
       </p:sp>
@@ -10432,46 +10713,251 @@
       </p:grpSpPr>
       <p:sp>
         <p:nvSpPr>
-          <p:cNvPr id="2" name="Titre 1"/>
-          <p:cNvSpPr>
-            <a:spLocks noGrp="1"/>
-          </p:cNvSpPr>
-          <p:nvPr>
-            <p:ph type="title"/>
-          </p:nvPr>
-        </p:nvSpPr>
-        <p:spPr/>
-        <p:txBody>
-          <a:bodyPr/>
+          <p:cNvPr id="5" name="ZoneTexte 4"/>
+          <p:cNvSpPr txBox="1"/>
+          <p:nvPr/>
+        </p:nvSpPr>
+        <p:spPr>
+          <a:xfrm>
+            <a:off x="401443" y="689145"/>
+            <a:ext cx="11790557" cy="5416868"/>
+          </a:xfrm>
+          <a:prstGeom prst="rect">
+            <a:avLst/>
+          </a:prstGeom>
+          <a:noFill/>
+        </p:spPr>
+        <p:txBody>
+          <a:bodyPr wrap="square" rtlCol="0">
+            <a:spAutoFit/>
+          </a:bodyPr>
           <a:lstStyle/>
           <a:p>
-            <a:endParaRPr lang="fr-FR"/>
-          </a:p>
-        </p:txBody>
-      </p:sp>
-      <p:sp>
-        <p:nvSpPr>
-          <p:cNvPr id="3" name="Espace réservé du contenu 2"/>
-          <p:cNvSpPr>
-            <a:spLocks noGrp="1"/>
-          </p:cNvSpPr>
-          <p:nvPr>
-            <p:ph idx="1"/>
-          </p:nvPr>
-        </p:nvSpPr>
-        <p:spPr/>
-        <p:txBody>
-          <a:bodyPr/>
-          <a:lstStyle/>
-          <a:p>
-            <a:endParaRPr lang="fr-FR"/>
+            <a:r>
+              <a:rPr lang="fr-FR" sz="6000" dirty="0" smtClean="0">
+                <a:latin typeface="Calibri" panose="020F0502020204030204" pitchFamily="34" charset="0"/>
+                <a:cs typeface="Courier New" panose="02070309020205020404" pitchFamily="49" charset="0"/>
+              </a:rPr>
+              <a:t>Que fait l’appel </a:t>
+            </a:r>
+          </a:p>
+          <a:p>
+            <a:r>
+              <a:rPr lang="fr-FR" sz="6000" dirty="0" smtClean="0">
+                <a:latin typeface="Courier New" panose="02070309020205020404" pitchFamily="49" charset="0"/>
+                <a:cs typeface="Courier New" panose="02070309020205020404" pitchFamily="49" charset="0"/>
+              </a:rPr>
+              <a:t>type(</a:t>
+            </a:r>
+            <a:r>
+              <a:rPr lang="fr-FR" sz="6000" dirty="0" err="1" smtClean="0">
+                <a:latin typeface="Courier New" panose="02070309020205020404" pitchFamily="49" charset="0"/>
+                <a:cs typeface="Courier New" panose="02070309020205020404" pitchFamily="49" charset="0"/>
+              </a:rPr>
+              <a:t>name</a:t>
+            </a:r>
+            <a:r>
+              <a:rPr lang="fr-FR" sz="6000" dirty="0">
+                <a:latin typeface="Courier New" panose="02070309020205020404" pitchFamily="49" charset="0"/>
+                <a:cs typeface="Courier New" panose="02070309020205020404" pitchFamily="49" charset="0"/>
+              </a:rPr>
+              <a:t>, bases, </a:t>
+            </a:r>
+            <a:r>
+              <a:rPr lang="fr-FR" sz="6000" dirty="0" err="1">
+                <a:latin typeface="Courier New" panose="02070309020205020404" pitchFamily="49" charset="0"/>
+                <a:cs typeface="Courier New" panose="02070309020205020404" pitchFamily="49" charset="0"/>
+              </a:rPr>
+              <a:t>dict</a:t>
+            </a:r>
+            <a:r>
+              <a:rPr lang="fr-FR" sz="6000" dirty="0">
+                <a:latin typeface="Courier New" panose="02070309020205020404" pitchFamily="49" charset="0"/>
+                <a:cs typeface="Courier New" panose="02070309020205020404" pitchFamily="49" charset="0"/>
+              </a:rPr>
+              <a:t>)</a:t>
+            </a:r>
+            <a:r>
+              <a:rPr lang="fr-FR" sz="6000" dirty="0">
+                <a:latin typeface="Calibri" panose="020F0502020204030204" pitchFamily="34" charset="0"/>
+                <a:cs typeface="Courier New" panose="02070309020205020404" pitchFamily="49" charset="0"/>
+              </a:rPr>
+              <a:t> </a:t>
+            </a:r>
+            <a:r>
+              <a:rPr lang="fr-FR" sz="6000" dirty="0" smtClean="0">
+                <a:latin typeface="Calibri" panose="020F0502020204030204" pitchFamily="34" charset="0"/>
+                <a:cs typeface="Courier New" panose="02070309020205020404" pitchFamily="49" charset="0"/>
+              </a:rPr>
+              <a:t>?</a:t>
+            </a:r>
+          </a:p>
+          <a:p>
+            <a:pPr marL="1143000" lvl="1" indent="-685800">
+              <a:buFont typeface="Arial" panose="020B0604020202020204" pitchFamily="34" charset="0"/>
+              <a:buChar char="•"/>
+            </a:pPr>
+            <a:r>
+              <a:rPr lang="fr-FR" sz="5400" dirty="0" smtClean="0">
+                <a:latin typeface="Calibri" panose="020F0502020204030204" pitchFamily="34" charset="0"/>
+                <a:cs typeface="Courier New" panose="02070309020205020404" pitchFamily="49" charset="0"/>
+              </a:rPr>
+              <a:t>Appel de </a:t>
+            </a:r>
+            <a:r>
+              <a:rPr lang="fr-FR" sz="5400" dirty="0" smtClean="0">
+                <a:latin typeface="Courier New" panose="02070309020205020404" pitchFamily="49" charset="0"/>
+                <a:cs typeface="Courier New" panose="02070309020205020404" pitchFamily="49" charset="0"/>
+              </a:rPr>
+              <a:t>__call__ </a:t>
+            </a:r>
+            <a:r>
+              <a:rPr lang="fr-FR" sz="5400" dirty="0" smtClean="0">
+                <a:latin typeface="Calibri" panose="020F0502020204030204" pitchFamily="34" charset="0"/>
+                <a:cs typeface="Courier New" panose="02070309020205020404" pitchFamily="49" charset="0"/>
+              </a:rPr>
+              <a:t>sur l’objet </a:t>
+            </a:r>
+            <a:r>
+              <a:rPr lang="fr-FR" sz="5400" dirty="0" smtClean="0">
+                <a:solidFill>
+                  <a:srgbClr val="00B050"/>
+                </a:solidFill>
+                <a:latin typeface="Courier New" panose="02070309020205020404" pitchFamily="49" charset="0"/>
+                <a:cs typeface="Courier New" panose="02070309020205020404" pitchFamily="49" charset="0"/>
+              </a:rPr>
+              <a:t>type</a:t>
+            </a:r>
+          </a:p>
+          <a:p>
+            <a:pPr lvl="1"/>
+            <a:endParaRPr lang="fr-FR" sz="5400" dirty="0">
+              <a:solidFill>
+                <a:srgbClr val="00B050"/>
+              </a:solidFill>
+              <a:latin typeface="Courier New" panose="02070309020205020404" pitchFamily="49" charset="0"/>
+              <a:cs typeface="Courier New" panose="02070309020205020404" pitchFamily="49" charset="0"/>
+            </a:endParaRPr>
+          </a:p>
+          <a:p>
+            <a:r>
+              <a:rPr lang="en-US" sz="3200" dirty="0" err="1">
+                <a:latin typeface="Courier New" panose="02070309020205020404" pitchFamily="49" charset="0"/>
+                <a:cs typeface="Courier New" panose="02070309020205020404" pitchFamily="49" charset="0"/>
+              </a:rPr>
+              <a:t>cls</a:t>
+            </a:r>
+            <a:r>
+              <a:rPr lang="en-US" sz="3200" dirty="0">
+                <a:latin typeface="Courier New" panose="02070309020205020404" pitchFamily="49" charset="0"/>
+                <a:cs typeface="Courier New" panose="02070309020205020404" pitchFamily="49" charset="0"/>
+              </a:rPr>
+              <a:t> = </a:t>
+            </a:r>
+            <a:r>
+              <a:rPr lang="en-US" sz="3200" dirty="0" err="1" smtClean="0">
+                <a:latin typeface="Courier New" panose="02070309020205020404" pitchFamily="49" charset="0"/>
+                <a:cs typeface="Courier New" panose="02070309020205020404" pitchFamily="49" charset="0"/>
+              </a:rPr>
+              <a:t>type.__</a:t>
+            </a:r>
+            <a:r>
+              <a:rPr lang="en-US" sz="3200" dirty="0" err="1">
+                <a:latin typeface="Courier New" panose="02070309020205020404" pitchFamily="49" charset="0"/>
+                <a:cs typeface="Courier New" panose="02070309020205020404" pitchFamily="49" charset="0"/>
+              </a:rPr>
+              <a:t>new</a:t>
+            </a:r>
+            <a:r>
+              <a:rPr lang="en-US" sz="3200" dirty="0" smtClean="0">
+                <a:latin typeface="Courier New" panose="02070309020205020404" pitchFamily="49" charset="0"/>
+                <a:cs typeface="Courier New" panose="02070309020205020404" pitchFamily="49" charset="0"/>
+              </a:rPr>
+              <a:t>__(type, </a:t>
+            </a:r>
+            <a:r>
+              <a:rPr lang="en-US" sz="3200" dirty="0">
+                <a:latin typeface="Courier New" panose="02070309020205020404" pitchFamily="49" charset="0"/>
+                <a:cs typeface="Courier New" panose="02070309020205020404" pitchFamily="49" charset="0"/>
+              </a:rPr>
+              <a:t>name, bases, </a:t>
+            </a:r>
+            <a:r>
+              <a:rPr lang="en-US" sz="3200" dirty="0" err="1">
+                <a:latin typeface="Courier New" panose="02070309020205020404" pitchFamily="49" charset="0"/>
+                <a:cs typeface="Courier New" panose="02070309020205020404" pitchFamily="49" charset="0"/>
+              </a:rPr>
+              <a:t>dict</a:t>
+            </a:r>
+            <a:r>
+              <a:rPr lang="en-US" sz="3200" dirty="0">
+                <a:latin typeface="Courier New" panose="02070309020205020404" pitchFamily="49" charset="0"/>
+                <a:cs typeface="Courier New" panose="02070309020205020404" pitchFamily="49" charset="0"/>
+              </a:rPr>
+              <a:t>)</a:t>
+            </a:r>
+          </a:p>
+          <a:p>
+            <a:r>
+              <a:rPr lang="en-US" sz="3200" dirty="0" smtClean="0">
+                <a:latin typeface="Courier New" panose="02070309020205020404" pitchFamily="49" charset="0"/>
+                <a:cs typeface="Courier New" panose="02070309020205020404" pitchFamily="49" charset="0"/>
+              </a:rPr>
+              <a:t>type.__</a:t>
+            </a:r>
+            <a:r>
+              <a:rPr lang="en-US" sz="3200" dirty="0" err="1">
+                <a:latin typeface="Courier New" panose="02070309020205020404" pitchFamily="49" charset="0"/>
+                <a:cs typeface="Courier New" panose="02070309020205020404" pitchFamily="49" charset="0"/>
+              </a:rPr>
+              <a:t>init</a:t>
+            </a:r>
+            <a:r>
+              <a:rPr lang="en-US" sz="3200" dirty="0">
+                <a:latin typeface="Courier New" panose="02070309020205020404" pitchFamily="49" charset="0"/>
+                <a:cs typeface="Courier New" panose="02070309020205020404" pitchFamily="49" charset="0"/>
+              </a:rPr>
+              <a:t>__(</a:t>
+            </a:r>
+            <a:r>
+              <a:rPr lang="en-US" sz="3200" dirty="0" err="1">
+                <a:latin typeface="Courier New" panose="02070309020205020404" pitchFamily="49" charset="0"/>
+                <a:cs typeface="Courier New" panose="02070309020205020404" pitchFamily="49" charset="0"/>
+              </a:rPr>
+              <a:t>cls</a:t>
+            </a:r>
+            <a:r>
+              <a:rPr lang="en-US" sz="3200" dirty="0">
+                <a:latin typeface="Courier New" panose="02070309020205020404" pitchFamily="49" charset="0"/>
+                <a:cs typeface="Courier New" panose="02070309020205020404" pitchFamily="49" charset="0"/>
+              </a:rPr>
+              <a:t>, name, bases, </a:t>
+            </a:r>
+            <a:r>
+              <a:rPr lang="en-US" sz="3200" dirty="0" err="1">
+                <a:latin typeface="Courier New" panose="02070309020205020404" pitchFamily="49" charset="0"/>
+                <a:cs typeface="Courier New" panose="02070309020205020404" pitchFamily="49" charset="0"/>
+              </a:rPr>
+              <a:t>dict</a:t>
+            </a:r>
+            <a:r>
+              <a:rPr lang="en-US" sz="3200" dirty="0">
+                <a:latin typeface="Courier New" panose="02070309020205020404" pitchFamily="49" charset="0"/>
+                <a:cs typeface="Courier New" panose="02070309020205020404" pitchFamily="49" charset="0"/>
+              </a:rPr>
+              <a:t>)</a:t>
+            </a:r>
+            <a:endParaRPr lang="fr-FR" sz="3200" dirty="0" smtClean="0">
+              <a:latin typeface="Courier New" panose="02070309020205020404" pitchFamily="49" charset="0"/>
+              <a:cs typeface="Courier New" panose="02070309020205020404" pitchFamily="49" charset="0"/>
+            </a:endParaRPr>
           </a:p>
         </p:txBody>
       </p:sp>
     </p:spTree>
     <p:extLst>
       <p:ext uri="{BB962C8B-B14F-4D97-AF65-F5344CB8AC3E}">
-        <p14:creationId xmlns:p14="http://schemas.microsoft.com/office/powerpoint/2010/main" val="2456821689"/>
+        <p14:creationId xmlns:p14="http://schemas.microsoft.com/office/powerpoint/2010/main" val="1807560953"/>
       </p:ext>
     </p:extLst>
   </p:cSld>
@@ -10484,6 +10970,788 @@
         <p:cTn id="1" dur="indefinite" restart="never" nodeType="tmRoot"/>
       </p:par>
     </p:tnLst>
+  </p:timing>
+</p:sld>
+</file>
+
+<file path=ppt/slides/slide21.xml><?xml version="1.0" encoding="utf-8"?>
+<p:sld xmlns:a="http://schemas.openxmlformats.org/drawingml/2006/main" xmlns:r="http://schemas.openxmlformats.org/officeDocument/2006/relationships" xmlns:p="http://schemas.openxmlformats.org/presentationml/2006/main">
+  <p:cSld>
+    <p:spTree>
+      <p:nvGrpSpPr>
+        <p:cNvPr id="1" name=""/>
+        <p:cNvGrpSpPr/>
+        <p:nvPr/>
+      </p:nvGrpSpPr>
+      <p:grpSpPr>
+        <a:xfrm>
+          <a:off x="0" y="0"/>
+          <a:ext cx="0" cy="0"/>
+          <a:chOff x="0" y="0"/>
+          <a:chExt cx="0" cy="0"/>
+        </a:xfrm>
+      </p:grpSpPr>
+      <p:sp>
+        <p:nvSpPr>
+          <p:cNvPr id="5" name="ZoneTexte 4"/>
+          <p:cNvSpPr txBox="1"/>
+          <p:nvPr/>
+        </p:nvSpPr>
+        <p:spPr>
+          <a:xfrm>
+            <a:off x="401443" y="689145"/>
+            <a:ext cx="11790557" cy="6001643"/>
+          </a:xfrm>
+          <a:prstGeom prst="rect">
+            <a:avLst/>
+          </a:prstGeom>
+          <a:noFill/>
+        </p:spPr>
+        <p:txBody>
+          <a:bodyPr wrap="square" rtlCol="0">
+            <a:spAutoFit/>
+          </a:bodyPr>
+          <a:lstStyle/>
+          <a:p>
+            <a:r>
+              <a:rPr lang="fr-FR" sz="6000" dirty="0" smtClean="0">
+                <a:latin typeface="Courier New" panose="02070309020205020404" pitchFamily="49" charset="0"/>
+                <a:cs typeface="Courier New" panose="02070309020205020404" pitchFamily="49" charset="0"/>
+              </a:rPr>
+              <a:t>__new__ </a:t>
+            </a:r>
+            <a:r>
+              <a:rPr lang="fr-FR" sz="6000" dirty="0" smtClean="0">
+                <a:latin typeface="Calibri" panose="020F0502020204030204" pitchFamily="34" charset="0"/>
+                <a:cs typeface="Courier New" panose="02070309020205020404" pitchFamily="49" charset="0"/>
+              </a:rPr>
+              <a:t>crée l’instance de la classe</a:t>
+            </a:r>
+          </a:p>
+          <a:p>
+            <a:pPr marL="1314450" lvl="1" indent="-857250">
+              <a:buFont typeface="Arial" panose="020B0604020202020204" pitchFamily="34" charset="0"/>
+              <a:buChar char="•"/>
+            </a:pPr>
+            <a:r>
+              <a:rPr lang="fr-FR" sz="4800" dirty="0" smtClean="0">
+                <a:latin typeface="Calibri" panose="020F0502020204030204" pitchFamily="34" charset="0"/>
+                <a:cs typeface="Courier New" panose="02070309020205020404" pitchFamily="49" charset="0"/>
+              </a:rPr>
+              <a:t>Utile pour modifier l’espace de nommage avant la création de la classe</a:t>
+            </a:r>
+            <a:endParaRPr lang="fr-FR" sz="4800" dirty="0" smtClean="0">
+              <a:latin typeface="Calibri" panose="020F0502020204030204" pitchFamily="34" charset="0"/>
+              <a:cs typeface="Courier New" panose="02070309020205020404" pitchFamily="49" charset="0"/>
+            </a:endParaRPr>
+          </a:p>
+          <a:p>
+            <a:r>
+              <a:rPr lang="fr-FR" sz="6000" dirty="0" smtClean="0">
+                <a:latin typeface="Courier New" panose="02070309020205020404" pitchFamily="49" charset="0"/>
+                <a:cs typeface="Courier New" panose="02070309020205020404" pitchFamily="49" charset="0"/>
+              </a:rPr>
+              <a:t>__</a:t>
+            </a:r>
+            <a:r>
+              <a:rPr lang="fr-FR" sz="6000" dirty="0" err="1" smtClean="0">
+                <a:latin typeface="Courier New" panose="02070309020205020404" pitchFamily="49" charset="0"/>
+                <a:cs typeface="Courier New" panose="02070309020205020404" pitchFamily="49" charset="0"/>
+              </a:rPr>
+              <a:t>init</a:t>
+            </a:r>
+            <a:r>
+              <a:rPr lang="fr-FR" sz="6000" dirty="0" smtClean="0">
+                <a:latin typeface="Courier New" panose="02070309020205020404" pitchFamily="49" charset="0"/>
+                <a:cs typeface="Courier New" panose="02070309020205020404" pitchFamily="49" charset="0"/>
+              </a:rPr>
+              <a:t>__ </a:t>
+            </a:r>
+            <a:r>
+              <a:rPr lang="fr-FR" sz="6000" dirty="0" smtClean="0">
+                <a:latin typeface="Calibri" panose="020F0502020204030204" pitchFamily="34" charset="0"/>
+                <a:cs typeface="Courier New" panose="02070309020205020404" pitchFamily="49" charset="0"/>
+              </a:rPr>
+              <a:t>initialise l’instance de la classe</a:t>
+            </a:r>
+          </a:p>
+          <a:p>
+            <a:pPr marL="1143000" lvl="1" indent="-685800">
+              <a:buFont typeface="Arial" panose="020B0604020202020204" pitchFamily="34" charset="0"/>
+              <a:buChar char="•"/>
+            </a:pPr>
+            <a:r>
+              <a:rPr lang="fr-FR" sz="4800" dirty="0" smtClean="0">
+                <a:latin typeface="Calibri" panose="020F0502020204030204" pitchFamily="34" charset="0"/>
+                <a:cs typeface="Courier New" panose="02070309020205020404" pitchFamily="49" charset="0"/>
+              </a:rPr>
+              <a:t>Utile pour initialiser la classe instanciée</a:t>
+            </a:r>
+            <a:endParaRPr lang="fr-FR" sz="4800" dirty="0" smtClean="0">
+              <a:latin typeface="Courier New" panose="02070309020205020404" pitchFamily="49" charset="0"/>
+              <a:cs typeface="Courier New" panose="02070309020205020404" pitchFamily="49" charset="0"/>
+            </a:endParaRPr>
+          </a:p>
+        </p:txBody>
+      </p:sp>
+    </p:spTree>
+    <p:extLst>
+      <p:ext uri="{BB962C8B-B14F-4D97-AF65-F5344CB8AC3E}">
+        <p14:creationId xmlns:p14="http://schemas.microsoft.com/office/powerpoint/2010/main" val="764096279"/>
+      </p:ext>
+    </p:extLst>
+  </p:cSld>
+  <p:clrMapOvr>
+    <a:masterClrMapping/>
+  </p:clrMapOvr>
+  <p:timing>
+    <p:tnLst>
+      <p:par>
+        <p:cTn id="1" dur="indefinite" restart="never" nodeType="tmRoot"/>
+      </p:par>
+    </p:tnLst>
+  </p:timing>
+</p:sld>
+</file>
+
+<file path=ppt/slides/slide22.xml><?xml version="1.0" encoding="utf-8"?>
+<p:sld xmlns:a="http://schemas.openxmlformats.org/drawingml/2006/main" xmlns:r="http://schemas.openxmlformats.org/officeDocument/2006/relationships" xmlns:p="http://schemas.openxmlformats.org/presentationml/2006/main">
+  <p:cSld>
+    <p:spTree>
+      <p:nvGrpSpPr>
+        <p:cNvPr id="1" name=""/>
+        <p:cNvGrpSpPr/>
+        <p:nvPr/>
+      </p:nvGrpSpPr>
+      <p:grpSpPr>
+        <a:xfrm>
+          <a:off x="0" y="0"/>
+          <a:ext cx="0" cy="0"/>
+          <a:chOff x="0" y="0"/>
+          <a:chExt cx="0" cy="0"/>
+        </a:xfrm>
+      </p:grpSpPr>
+      <p:sp>
+        <p:nvSpPr>
+          <p:cNvPr id="2" name="ZoneTexte 1"/>
+          <p:cNvSpPr txBox="1"/>
+          <p:nvPr/>
+        </p:nvSpPr>
+        <p:spPr>
+          <a:xfrm>
+            <a:off x="182880" y="133082"/>
+            <a:ext cx="12552218" cy="6370975"/>
+          </a:xfrm>
+          <a:prstGeom prst="rect">
+            <a:avLst/>
+          </a:prstGeom>
+          <a:noFill/>
+        </p:spPr>
+        <p:txBody>
+          <a:bodyPr wrap="square" rtlCol="0">
+            <a:spAutoFit/>
+          </a:bodyPr>
+          <a:lstStyle/>
+          <a:p>
+            <a:r>
+              <a:rPr lang="en-US" dirty="0">
+                <a:latin typeface="Courier New" panose="02070309020205020404" pitchFamily="49" charset="0"/>
+                <a:cs typeface="Courier New" panose="02070309020205020404" pitchFamily="49" charset="0"/>
+              </a:rPr>
+              <a:t>class </a:t>
+            </a:r>
+            <a:r>
+              <a:rPr lang="en-US" dirty="0" err="1" smtClean="0">
+                <a:latin typeface="Courier New" panose="02070309020205020404" pitchFamily="49" charset="0"/>
+                <a:cs typeface="Courier New" panose="02070309020205020404" pitchFamily="49" charset="0"/>
+              </a:rPr>
+              <a:t>MaMetaClasse</a:t>
+            </a:r>
+            <a:r>
+              <a:rPr lang="en-US" dirty="0" smtClean="0">
+                <a:latin typeface="Courier New" panose="02070309020205020404" pitchFamily="49" charset="0"/>
+                <a:cs typeface="Courier New" panose="02070309020205020404" pitchFamily="49" charset="0"/>
+              </a:rPr>
+              <a:t>(</a:t>
+            </a:r>
+            <a:r>
+              <a:rPr lang="en-US" dirty="0" smtClean="0">
+                <a:solidFill>
+                  <a:schemeClr val="accent2"/>
+                </a:solidFill>
+                <a:latin typeface="Courier New" panose="02070309020205020404" pitchFamily="49" charset="0"/>
+                <a:cs typeface="Courier New" panose="02070309020205020404" pitchFamily="49" charset="0"/>
+              </a:rPr>
+              <a:t>type</a:t>
+            </a:r>
+            <a:r>
+              <a:rPr lang="en-US" dirty="0">
+                <a:latin typeface="Courier New" panose="02070309020205020404" pitchFamily="49" charset="0"/>
+                <a:cs typeface="Courier New" panose="02070309020205020404" pitchFamily="49" charset="0"/>
+              </a:rPr>
+              <a:t>):</a:t>
+            </a:r>
+          </a:p>
+          <a:p>
+            <a:r>
+              <a:rPr lang="en-US" dirty="0">
+                <a:latin typeface="Courier New" panose="02070309020205020404" pitchFamily="49" charset="0"/>
+                <a:cs typeface="Courier New" panose="02070309020205020404" pitchFamily="49" charset="0"/>
+              </a:rPr>
+              <a:t>    </a:t>
+            </a:r>
+            <a:r>
+              <a:rPr lang="en-US" dirty="0" err="1">
+                <a:latin typeface="Courier New" panose="02070309020205020404" pitchFamily="49" charset="0"/>
+                <a:cs typeface="Courier New" panose="02070309020205020404" pitchFamily="49" charset="0"/>
+              </a:rPr>
+              <a:t>def</a:t>
+            </a:r>
+            <a:r>
+              <a:rPr lang="en-US" dirty="0">
+                <a:latin typeface="Courier New" panose="02070309020205020404" pitchFamily="49" charset="0"/>
+                <a:cs typeface="Courier New" panose="02070309020205020404" pitchFamily="49" charset="0"/>
+              </a:rPr>
+              <a:t> __new__(meta, name, bases, </a:t>
+            </a:r>
+            <a:r>
+              <a:rPr lang="en-US" dirty="0" err="1">
+                <a:latin typeface="Courier New" panose="02070309020205020404" pitchFamily="49" charset="0"/>
+                <a:cs typeface="Courier New" panose="02070309020205020404" pitchFamily="49" charset="0"/>
+              </a:rPr>
+              <a:t>classdict</a:t>
+            </a:r>
+            <a:r>
+              <a:rPr lang="en-US" dirty="0">
+                <a:latin typeface="Courier New" panose="02070309020205020404" pitchFamily="49" charset="0"/>
+                <a:cs typeface="Courier New" panose="02070309020205020404" pitchFamily="49" charset="0"/>
+              </a:rPr>
+              <a:t>):</a:t>
+            </a:r>
+          </a:p>
+          <a:p>
+            <a:r>
+              <a:rPr lang="en-US" dirty="0">
+                <a:latin typeface="Courier New" panose="02070309020205020404" pitchFamily="49" charset="0"/>
+                <a:cs typeface="Courier New" panose="02070309020205020404" pitchFamily="49" charset="0"/>
+              </a:rPr>
+              <a:t>        print "Avant la creation de </a:t>
+            </a:r>
+            <a:r>
+              <a:rPr lang="en-US" dirty="0" err="1">
+                <a:latin typeface="Courier New" panose="02070309020205020404" pitchFamily="49" charset="0"/>
+                <a:cs typeface="Courier New" panose="02070309020205020404" pitchFamily="49" charset="0"/>
+              </a:rPr>
+              <a:t>l'objet</a:t>
+            </a:r>
+            <a:r>
+              <a:rPr lang="en-US" dirty="0">
+                <a:latin typeface="Courier New" panose="02070309020205020404" pitchFamily="49" charset="0"/>
+                <a:cs typeface="Courier New" panose="02070309020205020404" pitchFamily="49" charset="0"/>
+              </a:rPr>
+              <a:t> </a:t>
+            </a:r>
+            <a:r>
+              <a:rPr lang="en-US" dirty="0" err="1">
+                <a:latin typeface="Courier New" panose="02070309020205020404" pitchFamily="49" charset="0"/>
+                <a:cs typeface="Courier New" panose="02070309020205020404" pitchFamily="49" charset="0"/>
+              </a:rPr>
+              <a:t>classe</a:t>
+            </a:r>
+            <a:r>
+              <a:rPr lang="en-US" dirty="0">
+                <a:latin typeface="Courier New" panose="02070309020205020404" pitchFamily="49" charset="0"/>
+                <a:cs typeface="Courier New" panose="02070309020205020404" pitchFamily="49" charset="0"/>
+              </a:rPr>
+              <a:t>", name</a:t>
+            </a:r>
+          </a:p>
+          <a:p>
+            <a:r>
+              <a:rPr lang="en-US" dirty="0">
+                <a:latin typeface="Courier New" panose="02070309020205020404" pitchFamily="49" charset="0"/>
+                <a:cs typeface="Courier New" panose="02070309020205020404" pitchFamily="49" charset="0"/>
+              </a:rPr>
+              <a:t>        print "</a:t>
+            </a:r>
+            <a:r>
+              <a:rPr lang="en-US" dirty="0" err="1">
+                <a:latin typeface="Courier New" panose="02070309020205020404" pitchFamily="49" charset="0"/>
+                <a:cs typeface="Courier New" panose="02070309020205020404" pitchFamily="49" charset="0"/>
+              </a:rPr>
+              <a:t>metaclasse</a:t>
+            </a:r>
+            <a:r>
+              <a:rPr lang="en-US" dirty="0">
+                <a:latin typeface="Courier New" panose="02070309020205020404" pitchFamily="49" charset="0"/>
+                <a:cs typeface="Courier New" panose="02070309020205020404" pitchFamily="49" charset="0"/>
+              </a:rPr>
+              <a:t> :", meta</a:t>
+            </a:r>
+          </a:p>
+          <a:p>
+            <a:r>
+              <a:rPr lang="en-US" dirty="0">
+                <a:latin typeface="Courier New" panose="02070309020205020404" pitchFamily="49" charset="0"/>
+                <a:cs typeface="Courier New" panose="02070309020205020404" pitchFamily="49" charset="0"/>
+              </a:rPr>
+              <a:t>        print "bases :", bases</a:t>
+            </a:r>
+          </a:p>
+          <a:p>
+            <a:r>
+              <a:rPr lang="en-US" dirty="0">
+                <a:latin typeface="Courier New" panose="02070309020205020404" pitchFamily="49" charset="0"/>
+                <a:cs typeface="Courier New" panose="02070309020205020404" pitchFamily="49" charset="0"/>
+              </a:rPr>
+              <a:t>        print "</a:t>
+            </a:r>
+            <a:r>
+              <a:rPr lang="en-US" dirty="0" err="1">
+                <a:latin typeface="Courier New" panose="02070309020205020404" pitchFamily="49" charset="0"/>
+                <a:cs typeface="Courier New" panose="02070309020205020404" pitchFamily="49" charset="0"/>
+              </a:rPr>
+              <a:t>dict</a:t>
+            </a:r>
+            <a:r>
+              <a:rPr lang="en-US" dirty="0">
+                <a:latin typeface="Courier New" panose="02070309020205020404" pitchFamily="49" charset="0"/>
+                <a:cs typeface="Courier New" panose="02070309020205020404" pitchFamily="49" charset="0"/>
+              </a:rPr>
+              <a:t> :", </a:t>
+            </a:r>
+            <a:r>
+              <a:rPr lang="en-US" dirty="0" err="1">
+                <a:latin typeface="Courier New" panose="02070309020205020404" pitchFamily="49" charset="0"/>
+                <a:cs typeface="Courier New" panose="02070309020205020404" pitchFamily="49" charset="0"/>
+              </a:rPr>
+              <a:t>classdict</a:t>
+            </a:r>
+            <a:endParaRPr lang="en-US" dirty="0">
+              <a:latin typeface="Courier New" panose="02070309020205020404" pitchFamily="49" charset="0"/>
+              <a:cs typeface="Courier New" panose="02070309020205020404" pitchFamily="49" charset="0"/>
+            </a:endParaRPr>
+          </a:p>
+          <a:p>
+            <a:r>
+              <a:rPr lang="en-US" dirty="0">
+                <a:latin typeface="Courier New" panose="02070309020205020404" pitchFamily="49" charset="0"/>
+                <a:cs typeface="Courier New" panose="02070309020205020404" pitchFamily="49" charset="0"/>
+              </a:rPr>
+              <a:t>        </a:t>
+            </a:r>
+            <a:r>
+              <a:rPr lang="en-US" dirty="0">
+                <a:solidFill>
+                  <a:schemeClr val="accent2"/>
+                </a:solidFill>
+                <a:latin typeface="Courier New" panose="02070309020205020404" pitchFamily="49" charset="0"/>
+                <a:cs typeface="Courier New" panose="02070309020205020404" pitchFamily="49" charset="0"/>
+              </a:rPr>
+              <a:t>return </a:t>
+            </a:r>
+            <a:r>
+              <a:rPr lang="en-US" dirty="0" err="1">
+                <a:solidFill>
+                  <a:schemeClr val="accent2"/>
+                </a:solidFill>
+                <a:latin typeface="Courier New" panose="02070309020205020404" pitchFamily="49" charset="0"/>
+                <a:cs typeface="Courier New" panose="02070309020205020404" pitchFamily="49" charset="0"/>
+              </a:rPr>
+              <a:t>type.__new</a:t>
+            </a:r>
+            <a:r>
+              <a:rPr lang="en-US" dirty="0">
+                <a:solidFill>
+                  <a:schemeClr val="accent2"/>
+                </a:solidFill>
+                <a:latin typeface="Courier New" panose="02070309020205020404" pitchFamily="49" charset="0"/>
+                <a:cs typeface="Courier New" panose="02070309020205020404" pitchFamily="49" charset="0"/>
+              </a:rPr>
+              <a:t>__(meta, name, bases, </a:t>
+            </a:r>
+            <a:r>
+              <a:rPr lang="en-US" dirty="0" err="1">
+                <a:solidFill>
+                  <a:schemeClr val="accent2"/>
+                </a:solidFill>
+                <a:latin typeface="Courier New" panose="02070309020205020404" pitchFamily="49" charset="0"/>
+                <a:cs typeface="Courier New" panose="02070309020205020404" pitchFamily="49" charset="0"/>
+              </a:rPr>
+              <a:t>classdict</a:t>
+            </a:r>
+            <a:r>
+              <a:rPr lang="en-US" dirty="0">
+                <a:solidFill>
+                  <a:schemeClr val="accent2"/>
+                </a:solidFill>
+                <a:latin typeface="Courier New" panose="02070309020205020404" pitchFamily="49" charset="0"/>
+                <a:cs typeface="Courier New" panose="02070309020205020404" pitchFamily="49" charset="0"/>
+              </a:rPr>
+              <a:t>)</a:t>
+            </a:r>
+          </a:p>
+          <a:p>
+            <a:endParaRPr lang="en-US" dirty="0">
+              <a:latin typeface="Courier New" panose="02070309020205020404" pitchFamily="49" charset="0"/>
+              <a:cs typeface="Courier New" panose="02070309020205020404" pitchFamily="49" charset="0"/>
+            </a:endParaRPr>
+          </a:p>
+          <a:p>
+            <a:r>
+              <a:rPr lang="en-US" dirty="0">
+                <a:latin typeface="Courier New" panose="02070309020205020404" pitchFamily="49" charset="0"/>
+                <a:cs typeface="Courier New" panose="02070309020205020404" pitchFamily="49" charset="0"/>
+              </a:rPr>
+              <a:t>    </a:t>
+            </a:r>
+            <a:r>
+              <a:rPr lang="en-US" dirty="0" err="1">
+                <a:latin typeface="Courier New" panose="02070309020205020404" pitchFamily="49" charset="0"/>
+                <a:cs typeface="Courier New" panose="02070309020205020404" pitchFamily="49" charset="0"/>
+              </a:rPr>
+              <a:t>def</a:t>
+            </a:r>
+            <a:r>
+              <a:rPr lang="en-US" dirty="0">
+                <a:latin typeface="Courier New" panose="02070309020205020404" pitchFamily="49" charset="0"/>
+                <a:cs typeface="Courier New" panose="02070309020205020404" pitchFamily="49" charset="0"/>
+              </a:rPr>
+              <a:t> __</a:t>
+            </a:r>
+            <a:r>
+              <a:rPr lang="en-US" dirty="0" err="1">
+                <a:latin typeface="Courier New" panose="02070309020205020404" pitchFamily="49" charset="0"/>
+                <a:cs typeface="Courier New" panose="02070309020205020404" pitchFamily="49" charset="0"/>
+              </a:rPr>
+              <a:t>init</a:t>
+            </a:r>
+            <a:r>
+              <a:rPr lang="en-US" dirty="0">
+                <a:latin typeface="Courier New" panose="02070309020205020404" pitchFamily="49" charset="0"/>
+                <a:cs typeface="Courier New" panose="02070309020205020404" pitchFamily="49" charset="0"/>
+              </a:rPr>
+              <a:t>__(</a:t>
+            </a:r>
+            <a:r>
+              <a:rPr lang="en-US" dirty="0" err="1">
+                <a:latin typeface="Courier New" panose="02070309020205020404" pitchFamily="49" charset="0"/>
+                <a:cs typeface="Courier New" panose="02070309020205020404" pitchFamily="49" charset="0"/>
+              </a:rPr>
+              <a:t>classe</a:t>
+            </a:r>
+            <a:r>
+              <a:rPr lang="en-US" dirty="0">
+                <a:latin typeface="Courier New" panose="02070309020205020404" pitchFamily="49" charset="0"/>
+                <a:cs typeface="Courier New" panose="02070309020205020404" pitchFamily="49" charset="0"/>
+              </a:rPr>
+              <a:t>, name, bases, </a:t>
+            </a:r>
+            <a:r>
+              <a:rPr lang="en-US" dirty="0" err="1">
+                <a:latin typeface="Courier New" panose="02070309020205020404" pitchFamily="49" charset="0"/>
+                <a:cs typeface="Courier New" panose="02070309020205020404" pitchFamily="49" charset="0"/>
+              </a:rPr>
+              <a:t>classdict</a:t>
+            </a:r>
+            <a:r>
+              <a:rPr lang="en-US" dirty="0">
+                <a:latin typeface="Courier New" panose="02070309020205020404" pitchFamily="49" charset="0"/>
+                <a:cs typeface="Courier New" panose="02070309020205020404" pitchFamily="49" charset="0"/>
+              </a:rPr>
+              <a:t>):</a:t>
+            </a:r>
+          </a:p>
+          <a:p>
+            <a:r>
+              <a:rPr lang="en-US" dirty="0">
+                <a:latin typeface="Courier New" panose="02070309020205020404" pitchFamily="49" charset="0"/>
+                <a:cs typeface="Courier New" panose="02070309020205020404" pitchFamily="49" charset="0"/>
+              </a:rPr>
+              <a:t>        print "</a:t>
+            </a:r>
+            <a:r>
+              <a:rPr lang="en-US" dirty="0" err="1">
+                <a:latin typeface="Courier New" panose="02070309020205020404" pitchFamily="49" charset="0"/>
+                <a:cs typeface="Courier New" panose="02070309020205020404" pitchFamily="49" charset="0"/>
+              </a:rPr>
+              <a:t>Apres</a:t>
+            </a:r>
+            <a:r>
+              <a:rPr lang="en-US" dirty="0">
+                <a:latin typeface="Courier New" panose="02070309020205020404" pitchFamily="49" charset="0"/>
+                <a:cs typeface="Courier New" panose="02070309020205020404" pitchFamily="49" charset="0"/>
+              </a:rPr>
+              <a:t> la creation de la </a:t>
+            </a:r>
+            <a:r>
+              <a:rPr lang="en-US" dirty="0" err="1">
+                <a:latin typeface="Courier New" panose="02070309020205020404" pitchFamily="49" charset="0"/>
+                <a:cs typeface="Courier New" panose="02070309020205020404" pitchFamily="49" charset="0"/>
+              </a:rPr>
+              <a:t>classe</a:t>
+            </a:r>
+            <a:r>
+              <a:rPr lang="en-US" dirty="0">
+                <a:latin typeface="Courier New" panose="02070309020205020404" pitchFamily="49" charset="0"/>
+                <a:cs typeface="Courier New" panose="02070309020205020404" pitchFamily="49" charset="0"/>
+              </a:rPr>
+              <a:t>", name</a:t>
+            </a:r>
+          </a:p>
+          <a:p>
+            <a:r>
+              <a:rPr lang="en-US" dirty="0">
+                <a:latin typeface="Courier New" panose="02070309020205020404" pitchFamily="49" charset="0"/>
+                <a:cs typeface="Courier New" panose="02070309020205020404" pitchFamily="49" charset="0"/>
+              </a:rPr>
+              <a:t>        print "</a:t>
+            </a:r>
+            <a:r>
+              <a:rPr lang="en-US" dirty="0" err="1">
+                <a:latin typeface="Courier New" panose="02070309020205020404" pitchFamily="49" charset="0"/>
+                <a:cs typeface="Courier New" panose="02070309020205020404" pitchFamily="49" charset="0"/>
+              </a:rPr>
+              <a:t>classe</a:t>
+            </a:r>
+            <a:r>
+              <a:rPr lang="en-US" dirty="0">
+                <a:latin typeface="Courier New" panose="02070309020205020404" pitchFamily="49" charset="0"/>
+                <a:cs typeface="Courier New" panose="02070309020205020404" pitchFamily="49" charset="0"/>
+              </a:rPr>
+              <a:t> :", </a:t>
+            </a:r>
+            <a:r>
+              <a:rPr lang="en-US" dirty="0" err="1">
+                <a:latin typeface="Courier New" panose="02070309020205020404" pitchFamily="49" charset="0"/>
+                <a:cs typeface="Courier New" panose="02070309020205020404" pitchFamily="49" charset="0"/>
+              </a:rPr>
+              <a:t>classe</a:t>
+            </a:r>
+            <a:endParaRPr lang="en-US" dirty="0">
+              <a:latin typeface="Courier New" panose="02070309020205020404" pitchFamily="49" charset="0"/>
+              <a:cs typeface="Courier New" panose="02070309020205020404" pitchFamily="49" charset="0"/>
+            </a:endParaRPr>
+          </a:p>
+          <a:p>
+            <a:r>
+              <a:rPr lang="en-US" dirty="0">
+                <a:latin typeface="Courier New" panose="02070309020205020404" pitchFamily="49" charset="0"/>
+                <a:cs typeface="Courier New" panose="02070309020205020404" pitchFamily="49" charset="0"/>
+              </a:rPr>
+              <a:t>        print "bases :", bases</a:t>
+            </a:r>
+          </a:p>
+          <a:p>
+            <a:r>
+              <a:rPr lang="en-US" dirty="0">
+                <a:latin typeface="Courier New" panose="02070309020205020404" pitchFamily="49" charset="0"/>
+                <a:cs typeface="Courier New" panose="02070309020205020404" pitchFamily="49" charset="0"/>
+              </a:rPr>
+              <a:t>        print "</a:t>
+            </a:r>
+            <a:r>
+              <a:rPr lang="en-US" dirty="0" err="1">
+                <a:latin typeface="Courier New" panose="02070309020205020404" pitchFamily="49" charset="0"/>
+                <a:cs typeface="Courier New" panose="02070309020205020404" pitchFamily="49" charset="0"/>
+              </a:rPr>
+              <a:t>dict</a:t>
+            </a:r>
+            <a:r>
+              <a:rPr lang="en-US" dirty="0">
+                <a:latin typeface="Courier New" panose="02070309020205020404" pitchFamily="49" charset="0"/>
+                <a:cs typeface="Courier New" panose="02070309020205020404" pitchFamily="49" charset="0"/>
+              </a:rPr>
+              <a:t> :", </a:t>
+            </a:r>
+            <a:r>
+              <a:rPr lang="en-US" dirty="0" err="1">
+                <a:latin typeface="Courier New" panose="02070309020205020404" pitchFamily="49" charset="0"/>
+                <a:cs typeface="Courier New" panose="02070309020205020404" pitchFamily="49" charset="0"/>
+              </a:rPr>
+              <a:t>classdict</a:t>
+            </a:r>
+            <a:endParaRPr lang="en-US" dirty="0">
+              <a:latin typeface="Courier New" panose="02070309020205020404" pitchFamily="49" charset="0"/>
+              <a:cs typeface="Courier New" panose="02070309020205020404" pitchFamily="49" charset="0"/>
+            </a:endParaRPr>
+          </a:p>
+          <a:p>
+            <a:r>
+              <a:rPr lang="en-US" dirty="0">
+                <a:latin typeface="Courier New" panose="02070309020205020404" pitchFamily="49" charset="0"/>
+                <a:cs typeface="Courier New" panose="02070309020205020404" pitchFamily="49" charset="0"/>
+              </a:rPr>
+              <a:t>     </a:t>
+            </a:r>
+          </a:p>
+          <a:p>
+            <a:r>
+              <a:rPr lang="en-US" dirty="0">
+                <a:latin typeface="Courier New" panose="02070309020205020404" pitchFamily="49" charset="0"/>
+                <a:cs typeface="Courier New" panose="02070309020205020404" pitchFamily="49" charset="0"/>
+              </a:rPr>
+              <a:t>class C(object):</a:t>
+            </a:r>
+          </a:p>
+          <a:p>
+            <a:r>
+              <a:rPr lang="en-US" dirty="0">
+                <a:latin typeface="Courier New" panose="02070309020205020404" pitchFamily="49" charset="0"/>
+                <a:cs typeface="Courier New" panose="02070309020205020404" pitchFamily="49" charset="0"/>
+              </a:rPr>
+              <a:t>    </a:t>
+            </a:r>
+            <a:r>
+              <a:rPr lang="en-US" dirty="0">
+                <a:solidFill>
+                  <a:schemeClr val="accent2"/>
+                </a:solidFill>
+                <a:latin typeface="Courier New" panose="02070309020205020404" pitchFamily="49" charset="0"/>
+                <a:cs typeface="Courier New" panose="02070309020205020404" pitchFamily="49" charset="0"/>
+              </a:rPr>
+              <a:t>__</a:t>
+            </a:r>
+            <a:r>
+              <a:rPr lang="en-US" dirty="0" err="1">
+                <a:solidFill>
+                  <a:schemeClr val="accent2"/>
+                </a:solidFill>
+                <a:latin typeface="Courier New" panose="02070309020205020404" pitchFamily="49" charset="0"/>
+                <a:cs typeface="Courier New" panose="02070309020205020404" pitchFamily="49" charset="0"/>
+              </a:rPr>
+              <a:t>metaclass</a:t>
+            </a:r>
+            <a:r>
+              <a:rPr lang="en-US" dirty="0">
+                <a:solidFill>
+                  <a:schemeClr val="accent2"/>
+                </a:solidFill>
+                <a:latin typeface="Courier New" panose="02070309020205020404" pitchFamily="49" charset="0"/>
+                <a:cs typeface="Courier New" panose="02070309020205020404" pitchFamily="49" charset="0"/>
+              </a:rPr>
+              <a:t>__ = </a:t>
+            </a:r>
+            <a:r>
+              <a:rPr lang="en-US" dirty="0" err="1" smtClean="0">
+                <a:solidFill>
+                  <a:schemeClr val="accent2"/>
+                </a:solidFill>
+                <a:latin typeface="Courier New" panose="02070309020205020404" pitchFamily="49" charset="0"/>
+                <a:cs typeface="Courier New" panose="02070309020205020404" pitchFamily="49" charset="0"/>
+              </a:rPr>
+              <a:t>MaMetaClasse</a:t>
+            </a:r>
+            <a:endParaRPr lang="en-US" dirty="0">
+              <a:solidFill>
+                <a:schemeClr val="accent2"/>
+              </a:solidFill>
+              <a:latin typeface="Courier New" panose="02070309020205020404" pitchFamily="49" charset="0"/>
+              <a:cs typeface="Courier New" panose="02070309020205020404" pitchFamily="49" charset="0"/>
+            </a:endParaRPr>
+          </a:p>
+          <a:p>
+            <a:r>
+              <a:rPr lang="en-US" dirty="0">
+                <a:latin typeface="Courier New" panose="02070309020205020404" pitchFamily="49" charset="0"/>
+                <a:cs typeface="Courier New" panose="02070309020205020404" pitchFamily="49" charset="0"/>
+              </a:rPr>
+              <a:t>    x = 1</a:t>
+            </a:r>
+            <a:endParaRPr lang="en-US" dirty="0">
+              <a:latin typeface="Courier New" panose="02070309020205020404" pitchFamily="49" charset="0"/>
+              <a:cs typeface="Courier New" panose="02070309020205020404" pitchFamily="49" charset="0"/>
+            </a:endParaRPr>
+          </a:p>
+        </p:txBody>
+      </p:sp>
+    </p:spTree>
+    <p:extLst>
+      <p:ext uri="{BB962C8B-B14F-4D97-AF65-F5344CB8AC3E}">
+        <p14:creationId xmlns:p14="http://schemas.microsoft.com/office/powerpoint/2010/main" val="4054198740"/>
+      </p:ext>
+    </p:extLst>
+  </p:cSld>
+  <p:clrMapOvr>
+    <a:masterClrMapping/>
+  </p:clrMapOvr>
+  <p:timing>
+    <p:tnLst>
+      <p:par>
+        <p:cTn id="1" dur="indefinite" restart="never" nodeType="tmRoot">
+          <p:childTnLst>
+            <p:seq concurrent="1" nextAc="seek">
+              <p:cTn id="2" dur="indefinite" nodeType="mainSeq">
+                <p:childTnLst>
+                  <p:par>
+                    <p:cTn id="3" fill="hold">
+                      <p:stCondLst>
+                        <p:cond delay="indefinite"/>
+                      </p:stCondLst>
+                      <p:childTnLst>
+                        <p:par>
+                          <p:cTn id="4" fill="hold">
+                            <p:stCondLst>
+                              <p:cond delay="0"/>
+                            </p:stCondLst>
+                            <p:childTnLst>
+                              <p:par>
+                                <p:cTn id="5" presetID="1" presetClass="entr" presetSubtype="0" fill="hold" grpId="0" nodeType="clickEffect">
+                                  <p:stCondLst>
+                                    <p:cond delay="0"/>
+                                  </p:stCondLst>
+                                  <p:childTnLst>
+                                    <p:set>
+                                      <p:cBhvr>
+                                        <p:cTn id="6" dur="1" fill="hold">
+                                          <p:stCondLst>
+                                            <p:cond delay="0"/>
+                                          </p:stCondLst>
+                                        </p:cTn>
+                                        <p:tgtEl>
+                                          <p:spTgt spid="2"/>
+                                        </p:tgtEl>
+                                        <p:attrNameLst>
+                                          <p:attrName>style.visibility</p:attrName>
+                                        </p:attrNameLst>
+                                      </p:cBhvr>
+                                      <p:to>
+                                        <p:strVal val="visible"/>
+                                      </p:to>
+                                    </p:set>
+                                  </p:childTnLst>
+                                </p:cTn>
+                              </p:par>
+                            </p:childTnLst>
+                          </p:cTn>
+                        </p:par>
+                      </p:childTnLst>
+                    </p:cTn>
+                  </p:par>
+                </p:childTnLst>
+              </p:cTn>
+              <p:prevCondLst>
+                <p:cond evt="onPrev" delay="0">
+                  <p:tgtEl>
+                    <p:sldTgt/>
+                  </p:tgtEl>
+                </p:cond>
+              </p:prevCondLst>
+              <p:nextCondLst>
+                <p:cond evt="onNext" delay="0">
+                  <p:tgtEl>
+                    <p:sldTgt/>
+                  </p:tgtEl>
+                </p:cond>
+              </p:nextCondLst>
+            </p:seq>
+          </p:childTnLst>
+        </p:cTn>
+      </p:par>
+    </p:tnLst>
+    <p:bldLst>
+      <p:bldP spid="2" grpId="0"/>
+    </p:bldLst>
   </p:timing>
 </p:sld>
 </file>
@@ -14627,18 +15895,18 @@
               <a:t>C’est une </a:t>
             </a:r>
             <a:r>
-              <a:rPr lang="fr-FR" sz="6000" dirty="0" err="1" smtClean="0">
+              <a:rPr lang="fr-FR" sz="6000" u="sng" dirty="0" err="1" smtClean="0">
                 <a:latin typeface="Calibri" panose="020F0502020204030204" pitchFamily="34" charset="0"/>
               </a:rPr>
               <a:t>métaclasse</a:t>
             </a:r>
             <a:r>
-              <a:rPr lang="fr-FR" sz="6000" dirty="0" smtClean="0">
+              <a:rPr lang="fr-FR" sz="6000" u="sng" dirty="0" smtClean="0">
                 <a:latin typeface="Calibri" panose="020F0502020204030204" pitchFamily="34" charset="0"/>
               </a:rPr>
               <a:t> </a:t>
             </a:r>
-            <a:endParaRPr lang="fr-FR" sz="6000" dirty="0">
+            <a:endParaRPr lang="fr-FR" sz="6000" u="sng" dirty="0">
               <a:latin typeface="Calibri" panose="020F0502020204030204" pitchFamily="34" charset="0"/>
             </a:endParaRPr>
           </a:p>
@@ -15650,10 +16918,6 @@
               </a:rPr>
               <a:t>'&gt;</a:t>
             </a:r>
-            <a:endParaRPr lang="en-US" sz="2800" dirty="0" smtClean="0">
-              <a:latin typeface="Courier New" panose="02070309020205020404" pitchFamily="49" charset="0"/>
-              <a:cs typeface="Courier New" panose="02070309020205020404" pitchFamily="49" charset="0"/>
-            </a:endParaRPr>
           </a:p>
         </p:txBody>
       </p:sp>

</xml_diff>

<commit_message>
changed animations on the slide
</commit_message>
<xml_diff>
--- a/semaine7/CO12AL-W7-VIDEO04-SLIDE01.pptx
+++ b/semaine7/CO12AL-W7-VIDEO04-SLIDE01.pptx
@@ -993,11 +993,7 @@
             </a:r>
             <a:r>
               <a:rPr lang="fr-FR" baseline="0" dirty="0" smtClean="0"/>
-              <a:t> y a trois grandes </a:t>
-            </a:r>
-            <a:r>
-              <a:rPr lang="fr-FR" baseline="0" dirty="0" smtClean="0"/>
-              <a:t>catégories d’objets</a:t>
+              <a:t> y a trois grandes catégories d’objets</a:t>
             </a:r>
           </a:p>
           <a:p>
@@ -2523,7 +2519,6 @@
               <a:rPr lang="fr-FR" baseline="0" dirty="0" smtClean="0"/>
               <a:t>. </a:t>
             </a:r>
-            <a:endParaRPr lang="fr-FR" baseline="0" dirty="0" smtClean="0"/>
           </a:p>
         </p:txBody>
       </p:sp>
@@ -2655,7 +2650,6 @@
               <a:rPr lang="fr-FR" baseline="0" dirty="0" smtClean="0"/>
               <a:t>. </a:t>
             </a:r>
-            <a:endParaRPr lang="fr-FR" baseline="0" dirty="0" smtClean="0"/>
           </a:p>
         </p:txBody>
       </p:sp>
@@ -7536,7 +7530,128 @@
   <p:timing>
     <p:tnLst>
       <p:par>
-        <p:cTn id="1" dur="indefinite" restart="never" nodeType="tmRoot"/>
+        <p:cTn id="1" dur="indefinite" restart="never" nodeType="tmRoot">
+          <p:childTnLst>
+            <p:seq concurrent="1" nextAc="seek">
+              <p:cTn id="2" dur="indefinite" nodeType="mainSeq">
+                <p:childTnLst>
+                  <p:par>
+                    <p:cTn id="3" fill="hold">
+                      <p:stCondLst>
+                        <p:cond delay="indefinite"/>
+                      </p:stCondLst>
+                      <p:childTnLst>
+                        <p:par>
+                          <p:cTn id="4" fill="hold">
+                            <p:stCondLst>
+                              <p:cond delay="0"/>
+                            </p:stCondLst>
+                            <p:childTnLst>
+                              <p:par>
+                                <p:cTn id="5" presetID="1" presetClass="entr" presetSubtype="0" fill="hold" nodeType="clickEffect">
+                                  <p:stCondLst>
+                                    <p:cond delay="0"/>
+                                  </p:stCondLst>
+                                  <p:childTnLst>
+                                    <p:set>
+                                      <p:cBhvr>
+                                        <p:cTn id="6" dur="1" fill="hold">
+                                          <p:stCondLst>
+                                            <p:cond delay="0"/>
+                                          </p:stCondLst>
+                                        </p:cTn>
+                                        <p:tgtEl>
+                                          <p:spTgt spid="5">
+                                            <p:txEl>
+                                              <p:pRg st="1" end="1"/>
+                                            </p:txEl>
+                                          </p:spTgt>
+                                        </p:tgtEl>
+                                        <p:attrNameLst>
+                                          <p:attrName>style.visibility</p:attrName>
+                                        </p:attrNameLst>
+                                      </p:cBhvr>
+                                      <p:to>
+                                        <p:strVal val="visible"/>
+                                      </p:to>
+                                    </p:set>
+                                  </p:childTnLst>
+                                </p:cTn>
+                              </p:par>
+                            </p:childTnLst>
+                          </p:cTn>
+                        </p:par>
+                      </p:childTnLst>
+                    </p:cTn>
+                  </p:par>
+                  <p:par>
+                    <p:cTn id="7" fill="hold">
+                      <p:stCondLst>
+                        <p:cond delay="indefinite"/>
+                      </p:stCondLst>
+                      <p:childTnLst>
+                        <p:par>
+                          <p:cTn id="8" fill="hold">
+                            <p:stCondLst>
+                              <p:cond delay="0"/>
+                            </p:stCondLst>
+                            <p:childTnLst>
+                              <p:par>
+                                <p:cTn id="9" presetID="1" presetClass="entr" presetSubtype="0" fill="hold" nodeType="clickEffect">
+                                  <p:stCondLst>
+                                    <p:cond delay="0"/>
+                                  </p:stCondLst>
+                                  <p:childTnLst>
+                                    <p:set>
+                                      <p:cBhvr>
+                                        <p:cTn id="10" dur="1" fill="hold">
+                                          <p:stCondLst>
+                                            <p:cond delay="0"/>
+                                          </p:stCondLst>
+                                        </p:cTn>
+                                        <p:tgtEl>
+                                          <p:spTgt spid="5">
+                                            <p:txEl>
+                                              <p:pRg st="2" end="2"/>
+                                            </p:txEl>
+                                          </p:spTgt>
+                                        </p:tgtEl>
+                                        <p:attrNameLst>
+                                          <p:attrName>style.visibility</p:attrName>
+                                        </p:attrNameLst>
+                                      </p:cBhvr>
+                                      <p:to>
+                                        <p:strVal val="visible"/>
+                                      </p:to>
+                                    </p:set>
+                                  </p:childTnLst>
+                                </p:cTn>
+                              </p:par>
+                            </p:childTnLst>
+                          </p:cTn>
+                        </p:par>
+                      </p:childTnLst>
+                    </p:cTn>
+                  </p:par>
+                </p:childTnLst>
+              </p:cTn>
+              <p:prevCondLst>
+                <p:cond evt="onPrev" delay="0">
+                  <p:tgtEl>
+                    <p:sldTgt/>
+                  </p:tgtEl>
+                </p:cond>
+              </p:prevCondLst>
+              <p:nextCondLst>
+                <p:cond evt="onNext" delay="0">
+                  <p:tgtEl>
+                    <p:sldTgt/>
+                  </p:tgtEl>
+                </p:cond>
+              </p:nextCondLst>
+            </p:seq>
+          </p:childTnLst>
+        </p:cTn>
       </p:par>
     </p:tnLst>
   </p:timing>
@@ -7672,7 +7787,79 @@
   <p:timing>
     <p:tnLst>
       <p:par>
-        <p:cTn id="1" dur="indefinite" restart="never" nodeType="tmRoot"/>
+        <p:cTn id="1" dur="indefinite" restart="never" nodeType="tmRoot">
+          <p:childTnLst>
+            <p:seq concurrent="1" nextAc="seek">
+              <p:cTn id="2" dur="indefinite" nodeType="mainSeq">
+                <p:childTnLst>
+                  <p:par>
+                    <p:cTn id="3" fill="hold">
+                      <p:stCondLst>
+                        <p:cond delay="indefinite"/>
+                      </p:stCondLst>
+                      <p:childTnLst>
+                        <p:par>
+                          <p:cTn id="4" fill="hold">
+                            <p:stCondLst>
+                              <p:cond delay="0"/>
+                            </p:stCondLst>
+                            <p:childTnLst>
+                              <p:par>
+                                <p:cTn id="5" presetID="1" presetClass="entr" presetSubtype="0" fill="hold" nodeType="clickEffect">
+                                  <p:stCondLst>
+                                    <p:cond delay="0"/>
+                                  </p:stCondLst>
+                                  <p:childTnLst>
+                                    <p:set>
+                                      <p:cBhvr>
+                                        <p:cTn id="6" dur="1" fill="hold">
+                                          <p:stCondLst>
+                                            <p:cond delay="0"/>
+                                          </p:stCondLst>
+                                        </p:cTn>
+                                        <p:tgtEl>
+                                          <p:spTgt spid="5">
+                                            <p:txEl>
+                                              <p:pRg st="1" end="1"/>
+                                            </p:txEl>
+                                          </p:spTgt>
+                                        </p:tgtEl>
+                                        <p:attrNameLst>
+                                          <p:attrName>style.visibility</p:attrName>
+                                        </p:attrNameLst>
+                                      </p:cBhvr>
+                                      <p:to>
+                                        <p:strVal val="visible"/>
+                                      </p:to>
+                                    </p:set>
+                                  </p:childTnLst>
+                                </p:cTn>
+                              </p:par>
+                            </p:childTnLst>
+                          </p:cTn>
+                        </p:par>
+                      </p:childTnLst>
+                    </p:cTn>
+                  </p:par>
+                </p:childTnLst>
+              </p:cTn>
+              <p:prevCondLst>
+                <p:cond evt="onPrev" delay="0">
+                  <p:tgtEl>
+                    <p:sldTgt/>
+                  </p:tgtEl>
+                </p:cond>
+              </p:prevCondLst>
+              <p:nextCondLst>
+                <p:cond evt="onNext" delay="0">
+                  <p:tgtEl>
+                    <p:sldTgt/>
+                  </p:tgtEl>
+                </p:cond>
+              </p:nextCondLst>
+            </p:seq>
+          </p:childTnLst>
+        </p:cTn>
       </p:par>
     </p:tnLst>
   </p:timing>
@@ -7789,7 +7976,79 @@
   <p:timing>
     <p:tnLst>
       <p:par>
-        <p:cTn id="1" dur="indefinite" restart="never" nodeType="tmRoot"/>
+        <p:cTn id="1" dur="indefinite" restart="never" nodeType="tmRoot">
+          <p:childTnLst>
+            <p:seq concurrent="1" nextAc="seek">
+              <p:cTn id="2" dur="indefinite" nodeType="mainSeq">
+                <p:childTnLst>
+                  <p:par>
+                    <p:cTn id="3" fill="hold">
+                      <p:stCondLst>
+                        <p:cond delay="indefinite"/>
+                      </p:stCondLst>
+                      <p:childTnLst>
+                        <p:par>
+                          <p:cTn id="4" fill="hold">
+                            <p:stCondLst>
+                              <p:cond delay="0"/>
+                            </p:stCondLst>
+                            <p:childTnLst>
+                              <p:par>
+                                <p:cTn id="5" presetID="1" presetClass="entr" presetSubtype="0" fill="hold" nodeType="clickEffect">
+                                  <p:stCondLst>
+                                    <p:cond delay="0"/>
+                                  </p:stCondLst>
+                                  <p:childTnLst>
+                                    <p:set>
+                                      <p:cBhvr>
+                                        <p:cTn id="6" dur="1" fill="hold">
+                                          <p:stCondLst>
+                                            <p:cond delay="0"/>
+                                          </p:stCondLst>
+                                        </p:cTn>
+                                        <p:tgtEl>
+                                          <p:spTgt spid="5">
+                                            <p:txEl>
+                                              <p:pRg st="1" end="1"/>
+                                            </p:txEl>
+                                          </p:spTgt>
+                                        </p:tgtEl>
+                                        <p:attrNameLst>
+                                          <p:attrName>style.visibility</p:attrName>
+                                        </p:attrNameLst>
+                                      </p:cBhvr>
+                                      <p:to>
+                                        <p:strVal val="visible"/>
+                                      </p:to>
+                                    </p:set>
+                                  </p:childTnLst>
+                                </p:cTn>
+                              </p:par>
+                            </p:childTnLst>
+                          </p:cTn>
+                        </p:par>
+                      </p:childTnLst>
+                    </p:cTn>
+                  </p:par>
+                </p:childTnLst>
+              </p:cTn>
+              <p:prevCondLst>
+                <p:cond evt="onPrev" delay="0">
+                  <p:tgtEl>
+                    <p:sldTgt/>
+                  </p:tgtEl>
+                </p:cond>
+              </p:prevCondLst>
+              <p:nextCondLst>
+                <p:cond evt="onNext" delay="0">
+                  <p:tgtEl>
+                    <p:sldTgt/>
+                  </p:tgtEl>
+                </p:cond>
+              </p:nextCondLst>
+            </p:seq>
+          </p:childTnLst>
+        </p:cTn>
       </p:par>
     </p:tnLst>
   </p:timing>
@@ -7892,7 +8151,79 @@
   <p:timing>
     <p:tnLst>
       <p:par>
-        <p:cTn id="1" dur="indefinite" restart="never" nodeType="tmRoot"/>
+        <p:cTn id="1" dur="indefinite" restart="never" nodeType="tmRoot">
+          <p:childTnLst>
+            <p:seq concurrent="1" nextAc="seek">
+              <p:cTn id="2" dur="indefinite" nodeType="mainSeq">
+                <p:childTnLst>
+                  <p:par>
+                    <p:cTn id="3" fill="hold">
+                      <p:stCondLst>
+                        <p:cond delay="indefinite"/>
+                      </p:stCondLst>
+                      <p:childTnLst>
+                        <p:par>
+                          <p:cTn id="4" fill="hold">
+                            <p:stCondLst>
+                              <p:cond delay="0"/>
+                            </p:stCondLst>
+                            <p:childTnLst>
+                              <p:par>
+                                <p:cTn id="5" presetID="1" presetClass="entr" presetSubtype="0" fill="hold" nodeType="clickEffect">
+                                  <p:stCondLst>
+                                    <p:cond delay="0"/>
+                                  </p:stCondLst>
+                                  <p:childTnLst>
+                                    <p:set>
+                                      <p:cBhvr>
+                                        <p:cTn id="6" dur="1" fill="hold">
+                                          <p:stCondLst>
+                                            <p:cond delay="0"/>
+                                          </p:stCondLst>
+                                        </p:cTn>
+                                        <p:tgtEl>
+                                          <p:spTgt spid="5">
+                                            <p:txEl>
+                                              <p:pRg st="1" end="1"/>
+                                            </p:txEl>
+                                          </p:spTgt>
+                                        </p:tgtEl>
+                                        <p:attrNameLst>
+                                          <p:attrName>style.visibility</p:attrName>
+                                        </p:attrNameLst>
+                                      </p:cBhvr>
+                                      <p:to>
+                                        <p:strVal val="visible"/>
+                                      </p:to>
+                                    </p:set>
+                                  </p:childTnLst>
+                                </p:cTn>
+                              </p:par>
+                            </p:childTnLst>
+                          </p:cTn>
+                        </p:par>
+                      </p:childTnLst>
+                    </p:cTn>
+                  </p:par>
+                </p:childTnLst>
+              </p:cTn>
+              <p:prevCondLst>
+                <p:cond evt="onPrev" delay="0">
+                  <p:tgtEl>
+                    <p:sldTgt/>
+                  </p:tgtEl>
+                </p:cond>
+              </p:prevCondLst>
+              <p:nextCondLst>
+                <p:cond evt="onNext" delay="0">
+                  <p:tgtEl>
+                    <p:sldTgt/>
+                  </p:tgtEl>
+                </p:cond>
+              </p:nextCondLst>
+            </p:seq>
+          </p:childTnLst>
+        </p:cTn>
       </p:par>
     </p:tnLst>
   </p:timing>
@@ -11040,10 +11371,6 @@
               </a:rPr>
               <a:t>Utile pour modifier l’espace de nommage avant la création de la classe</a:t>
             </a:r>
-            <a:endParaRPr lang="fr-FR" sz="4800" dirty="0" smtClean="0">
-              <a:latin typeface="Calibri" panose="020F0502020204030204" pitchFamily="34" charset="0"/>
-              <a:cs typeface="Courier New" panose="02070309020205020404" pitchFamily="49" charset="0"/>
-            </a:endParaRPr>
           </a:p>
           <a:p>
             <a:r>
@@ -11658,10 +11985,6 @@
               </a:rPr>
               <a:t>    x = 1</a:t>
             </a:r>
-            <a:endParaRPr lang="en-US" dirty="0">
-              <a:latin typeface="Courier New" panose="02070309020205020404" pitchFamily="49" charset="0"/>
-              <a:cs typeface="Courier New" panose="02070309020205020404" pitchFamily="49" charset="0"/>
-            </a:endParaRPr>
           </a:p>
         </p:txBody>
       </p:sp>

</xml_diff>

<commit_message>
minor modif on VIDEO04 added the VIDEO05 on performance.
</commit_message>
<xml_diff>
--- a/semaine7/CO12AL-W7-VIDEO04-SLIDE01.pptx
+++ b/semaine7/CO12AL-W7-VIDEO04-SLIDE01.pptx
@@ -10176,8 +10176,8 @@
         </p:nvSpPr>
         <p:spPr>
           <a:xfrm>
-            <a:off x="5704962" y="2090172"/>
-            <a:ext cx="6487038" cy="4401205"/>
+            <a:off x="5704962" y="1480572"/>
+            <a:ext cx="6487038" cy="4832092"/>
           </a:xfrm>
           <a:prstGeom prst="rect">
             <a:avLst/>
@@ -10195,14 +10195,37 @@
                 <a:latin typeface="Courier New" panose="02070309020205020404" pitchFamily="49" charset="0"/>
                 <a:cs typeface="Courier New" panose="02070309020205020404" pitchFamily="49" charset="0"/>
               </a:rPr>
+              <a:t>lst</a:t>
+            </a:r>
+            <a:r>
+              <a:rPr lang="en-US" sz="2800" dirty="0">
+                <a:latin typeface="Courier New" panose="02070309020205020404" pitchFamily="49" charset="0"/>
+                <a:cs typeface="Courier New" panose="02070309020205020404" pitchFamily="49" charset="0"/>
+              </a:rPr>
+              <a:t> = []</a:t>
+            </a:r>
+          </a:p>
+          <a:p>
+            <a:r>
+              <a:rPr lang="en-US" sz="2800" dirty="0" err="1" smtClean="0">
+                <a:latin typeface="Courier New" panose="02070309020205020404" pitchFamily="49" charset="0"/>
+                <a:cs typeface="Courier New" panose="02070309020205020404" pitchFamily="49" charset="0"/>
+              </a:rPr>
               <a:t>def</a:t>
             </a:r>
             <a:r>
+              <a:rPr lang="en-US" sz="2800" dirty="0" smtClean="0">
+                <a:latin typeface="Courier New" panose="02070309020205020404" pitchFamily="49" charset="0"/>
+                <a:cs typeface="Courier New" panose="02070309020205020404" pitchFamily="49" charset="0"/>
+              </a:rPr>
+              <a:t> </a:t>
+            </a:r>
+            <a:r>
               <a:rPr lang="en-US" sz="2800" dirty="0">
                 <a:latin typeface="Courier New" panose="02070309020205020404" pitchFamily="49" charset="0"/>
                 <a:cs typeface="Courier New" panose="02070309020205020404" pitchFamily="49" charset="0"/>
               </a:rPr>
-              <a:t> __</a:t>
+              <a:t>__</a:t>
             </a:r>
             <a:r>
               <a:rPr lang="en-US" sz="2800" dirty="0" err="1">
@@ -10667,39 +10690,26 @@
                                   </p:childTnLst>
                                 </p:cTn>
                               </p:par>
+                            </p:childTnLst>
+                          </p:cTn>
+                        </p:par>
+                      </p:childTnLst>
+                    </p:cTn>
+                  </p:par>
+                  <p:par>
+                    <p:cTn id="11" fill="hold">
+                      <p:stCondLst>
+                        <p:cond delay="indefinite"/>
+                      </p:stCondLst>
+                      <p:childTnLst>
+                        <p:par>
+                          <p:cTn id="12" fill="hold">
+                            <p:stCondLst>
+                              <p:cond delay="0"/>
+                            </p:stCondLst>
+                            <p:childTnLst>
                               <p:par>
-                                <p:cTn id="11" presetID="1" presetClass="entr" presetSubtype="0" fill="hold" nodeType="withEffect">
-                                  <p:stCondLst>
-                                    <p:cond delay="0"/>
-                                  </p:stCondLst>
-                                  <p:childTnLst>
-                                    <p:set>
-                                      <p:cBhvr>
-                                        <p:cTn id="12" dur="1" fill="hold">
-                                          <p:stCondLst>
-                                            <p:cond delay="0"/>
-                                          </p:stCondLst>
-                                        </p:cTn>
-                                        <p:tgtEl>
-                                          <p:spTgt spid="6">
-                                            <p:txEl>
-                                              <p:pRg st="1" end="1"/>
-                                            </p:txEl>
-                                          </p:spTgt>
-                                        </p:tgtEl>
-                                        <p:attrNameLst>
-                                          <p:attrName>style.visibility</p:attrName>
-                                        </p:attrNameLst>
-                                      </p:cBhvr>
-                                      <p:to>
-                                        <p:strVal val="visible"/>
-                                      </p:to>
-                                    </p:set>
-                                  </p:childTnLst>
-                                </p:cTn>
-                              </p:par>
-                              <p:par>
-                                <p:cTn id="13" presetID="1" presetClass="entr" presetSubtype="0" fill="hold" nodeType="withEffect">
+                                <p:cTn id="13" presetID="1" presetClass="entr" presetSubtype="0" fill="hold" nodeType="clickEffect">
                                   <p:stCondLst>
                                     <p:cond delay="0"/>
                                   </p:stCondLst>
@@ -10714,7 +10724,7 @@
                                         <p:tgtEl>
                                           <p:spTgt spid="6">
                                             <p:txEl>
-                                              <p:pRg st="2" end="2"/>
+                                              <p:pRg st="1" end="1"/>
                                             </p:txEl>
                                           </p:spTgt>
                                         </p:tgtEl>
@@ -10745,7 +10755,69 @@
                                         <p:tgtEl>
                                           <p:spTgt spid="6">
                                             <p:txEl>
+                                              <p:pRg st="2" end="2"/>
+                                            </p:txEl>
+                                          </p:spTgt>
+                                        </p:tgtEl>
+                                        <p:attrNameLst>
+                                          <p:attrName>style.visibility</p:attrName>
+                                        </p:attrNameLst>
+                                      </p:cBhvr>
+                                      <p:to>
+                                        <p:strVal val="visible"/>
+                                      </p:to>
+                                    </p:set>
+                                  </p:childTnLst>
+                                </p:cTn>
+                              </p:par>
+                              <p:par>
+                                <p:cTn id="17" presetID="1" presetClass="entr" presetSubtype="0" fill="hold" nodeType="withEffect">
+                                  <p:stCondLst>
+                                    <p:cond delay="0"/>
+                                  </p:stCondLst>
+                                  <p:childTnLst>
+                                    <p:set>
+                                      <p:cBhvr>
+                                        <p:cTn id="18" dur="1" fill="hold">
+                                          <p:stCondLst>
+                                            <p:cond delay="0"/>
+                                          </p:stCondLst>
+                                        </p:cTn>
+                                        <p:tgtEl>
+                                          <p:spTgt spid="6">
+                                            <p:txEl>
                                               <p:pRg st="3" end="3"/>
+                                            </p:txEl>
+                                          </p:spTgt>
+                                        </p:tgtEl>
+                                        <p:attrNameLst>
+                                          <p:attrName>style.visibility</p:attrName>
+                                        </p:attrNameLst>
+                                      </p:cBhvr>
+                                      <p:to>
+                                        <p:strVal val="visible"/>
+                                      </p:to>
+                                    </p:set>
+                                  </p:childTnLst>
+                                </p:cTn>
+                              </p:par>
+                              <p:par>
+                                <p:cTn id="19" presetID="1" presetClass="entr" presetSubtype="0" fill="hold" nodeType="withEffect">
+                                  <p:stCondLst>
+                                    <p:cond delay="0"/>
+                                  </p:stCondLst>
+                                  <p:childTnLst>
+                                    <p:set>
+                                      <p:cBhvr>
+                                        <p:cTn id="20" dur="1" fill="hold">
+                                          <p:stCondLst>
+                                            <p:cond delay="0"/>
+                                          </p:stCondLst>
+                                        </p:cTn>
+                                        <p:tgtEl>
+                                          <p:spTgt spid="6">
+                                            <p:txEl>
+                                              <p:pRg st="4" end="4"/>
                                             </p:txEl>
                                           </p:spTgt>
                                         </p:tgtEl>
@@ -10767,57 +10839,26 @@
                     </p:cTn>
                   </p:par>
                   <p:par>
-                    <p:cTn id="17" fill="hold">
+                    <p:cTn id="21" fill="hold">
                       <p:stCondLst>
                         <p:cond delay="indefinite"/>
                       </p:stCondLst>
                       <p:childTnLst>
                         <p:par>
-                          <p:cTn id="18" fill="hold">
+                          <p:cTn id="22" fill="hold">
                             <p:stCondLst>
                               <p:cond delay="0"/>
                             </p:stCondLst>
                             <p:childTnLst>
                               <p:par>
-                                <p:cTn id="19" presetID="1" presetClass="entr" presetSubtype="0" fill="hold" nodeType="clickEffect">
+                                <p:cTn id="23" presetID="1" presetClass="entr" presetSubtype="0" fill="hold" nodeType="clickEffect">
                                   <p:stCondLst>
                                     <p:cond delay="0"/>
                                   </p:stCondLst>
                                   <p:childTnLst>
                                     <p:set>
                                       <p:cBhvr>
-                                        <p:cTn id="20" dur="1" fill="hold">
-                                          <p:stCondLst>
-                                            <p:cond delay="0"/>
-                                          </p:stCondLst>
-                                        </p:cTn>
-                                        <p:tgtEl>
-                                          <p:spTgt spid="6">
-                                            <p:txEl>
-                                              <p:pRg st="5" end="5"/>
-                                            </p:txEl>
-                                          </p:spTgt>
-                                        </p:tgtEl>
-                                        <p:attrNameLst>
-                                          <p:attrName>style.visibility</p:attrName>
-                                        </p:attrNameLst>
-                                      </p:cBhvr>
-                                      <p:to>
-                                        <p:strVal val="visible"/>
-                                      </p:to>
-                                    </p:set>
-                                  </p:childTnLst>
-                                </p:cTn>
-                              </p:par>
-                              <p:par>
-                                <p:cTn id="21" presetID="1" presetClass="entr" presetSubtype="0" fill="hold" nodeType="withEffect">
-                                  <p:stCondLst>
-                                    <p:cond delay="0"/>
-                                  </p:stCondLst>
-                                  <p:childTnLst>
-                                    <p:set>
-                                      <p:cBhvr>
-                                        <p:cTn id="22" dur="1" fill="hold">
+                                        <p:cTn id="24" dur="1" fill="hold">
                                           <p:stCondLst>
                                             <p:cond delay="0"/>
                                           </p:stCondLst>
@@ -10841,14 +10882,14 @@
                                 </p:cTn>
                               </p:par>
                               <p:par>
-                                <p:cTn id="23" presetID="1" presetClass="entr" presetSubtype="0" fill="hold" nodeType="withEffect">
+                                <p:cTn id="25" presetID="1" presetClass="entr" presetSubtype="0" fill="hold" nodeType="withEffect">
                                   <p:stCondLst>
                                     <p:cond delay="0"/>
                                   </p:stCondLst>
                                   <p:childTnLst>
                                     <p:set>
                                       <p:cBhvr>
-                                        <p:cTn id="24" dur="1" fill="hold">
+                                        <p:cTn id="26" dur="1" fill="hold">
                                           <p:stCondLst>
                                             <p:cond delay="0"/>
                                           </p:stCondLst>
@@ -10871,26 +10912,8 @@
                                   </p:childTnLst>
                                 </p:cTn>
                               </p:par>
-                            </p:childTnLst>
-                          </p:cTn>
-                        </p:par>
-                      </p:childTnLst>
-                    </p:cTn>
-                  </p:par>
-                  <p:par>
-                    <p:cTn id="25" fill="hold">
-                      <p:stCondLst>
-                        <p:cond delay="indefinite"/>
-                      </p:stCondLst>
-                      <p:childTnLst>
-                        <p:par>
-                          <p:cTn id="26" fill="hold">
-                            <p:stCondLst>
-                              <p:cond delay="0"/>
-                            </p:stCondLst>
-                            <p:childTnLst>
                               <p:par>
-                                <p:cTn id="27" presetID="1" presetClass="entr" presetSubtype="0" fill="hold" nodeType="clickEffect">
+                                <p:cTn id="27" presetID="1" presetClass="entr" presetSubtype="0" fill="hold" nodeType="withEffect">
                                   <p:stCondLst>
                                     <p:cond delay="0"/>
                                   </p:stCondLst>
@@ -10905,7 +10928,56 @@
                                         <p:tgtEl>
                                           <p:spTgt spid="6">
                                             <p:txEl>
-                                              <p:pRg st="9" end="9"/>
+                                              <p:pRg st="8" end="8"/>
+                                            </p:txEl>
+                                          </p:spTgt>
+                                        </p:tgtEl>
+                                        <p:attrNameLst>
+                                          <p:attrName>style.visibility</p:attrName>
+                                        </p:attrNameLst>
+                                      </p:cBhvr>
+                                      <p:to>
+                                        <p:strVal val="visible"/>
+                                      </p:to>
+                                    </p:set>
+                                  </p:childTnLst>
+                                </p:cTn>
+                              </p:par>
+                            </p:childTnLst>
+                          </p:cTn>
+                        </p:par>
+                      </p:childTnLst>
+                    </p:cTn>
+                  </p:par>
+                  <p:par>
+                    <p:cTn id="29" fill="hold">
+                      <p:stCondLst>
+                        <p:cond delay="indefinite"/>
+                      </p:stCondLst>
+                      <p:childTnLst>
+                        <p:par>
+                          <p:cTn id="30" fill="hold">
+                            <p:stCondLst>
+                              <p:cond delay="0"/>
+                            </p:stCondLst>
+                            <p:childTnLst>
+                              <p:par>
+                                <p:cTn id="31" presetID="1" presetClass="entr" presetSubtype="0" fill="hold" nodeType="clickEffect">
+                                  <p:stCondLst>
+                                    <p:cond delay="0"/>
+                                  </p:stCondLst>
+                                  <p:childTnLst>
+                                    <p:set>
+                                      <p:cBhvr>
+                                        <p:cTn id="32" dur="1" fill="hold">
+                                          <p:stCondLst>
+                                            <p:cond delay="0"/>
+                                          </p:stCondLst>
+                                        </p:cTn>
+                                        <p:tgtEl>
+                                          <p:spTgt spid="6">
+                                            <p:txEl>
+                                              <p:pRg st="10" end="10"/>
                                             </p:txEl>
                                           </p:spTgt>
                                         </p:tgtEl>

</xml_diff>